<commit_message>
1st draft is completed
</commit_message>
<xml_diff>
--- a/software_version_control/02_VersionCont.pptx
+++ b/software_version_control/02_VersionCont.pptx
@@ -1,11 +1,11 @@
 
 <file path=ppt/presentation.xml><?xml version="1.0" encoding="utf-8"?>
-<p:presentation xmlns:a="http://schemas.openxmlformats.org/drawingml/2006/main" xmlns:r="http://schemas.openxmlformats.org/officeDocument/2006/relationships" xmlns:p="http://schemas.openxmlformats.org/presentationml/2006/main" saveSubsetFonts="1" autoCompressPictures="0">
+<p:presentation xmlns:a="http://schemas.openxmlformats.org/drawingml/2006/main" xmlns:r="http://schemas.openxmlformats.org/officeDocument/2006/relationships" xmlns:p="http://schemas.openxmlformats.org/presentationml/2006/main" removePersonalInfoOnSave="1" saveSubsetFonts="1" autoCompressPictures="0">
   <p:sldMasterIdLst>
     <p:sldMasterId id="2147483696" r:id="rId1"/>
   </p:sldMasterIdLst>
   <p:notesMasterIdLst>
-    <p:notesMasterId r:id="rId15"/>
+    <p:notesMasterId r:id="rId20"/>
   </p:notesMasterIdLst>
   <p:sldIdLst>
     <p:sldId id="297" r:id="rId2"/>
@@ -15,12 +15,17 @@
     <p:sldId id="430" r:id="rId6"/>
     <p:sldId id="431" r:id="rId7"/>
     <p:sldId id="433" r:id="rId8"/>
-    <p:sldId id="432" r:id="rId9"/>
-    <p:sldId id="434" r:id="rId10"/>
-    <p:sldId id="426" r:id="rId11"/>
-    <p:sldId id="427" r:id="rId12"/>
-    <p:sldId id="409" r:id="rId13"/>
-    <p:sldId id="424" r:id="rId14"/>
+    <p:sldId id="434" r:id="rId9"/>
+    <p:sldId id="435" r:id="rId10"/>
+    <p:sldId id="436" r:id="rId11"/>
+    <p:sldId id="432" r:id="rId12"/>
+    <p:sldId id="437" r:id="rId13"/>
+    <p:sldId id="438" r:id="rId14"/>
+    <p:sldId id="426" r:id="rId15"/>
+    <p:sldId id="439" r:id="rId16"/>
+    <p:sldId id="440" r:id="rId17"/>
+    <p:sldId id="441" r:id="rId18"/>
+    <p:sldId id="424" r:id="rId19"/>
   </p:sldIdLst>
   <p:sldSz cx="9144000" cy="6858000" type="screen4x3"/>
   <p:notesSz cx="6858000" cy="9144000"/>
@@ -227,7 +232,7 @@
           <a:p>
             <a:fld id="{C5D37280-896D-453C-A8B2-790CBDCE44E5}" type="datetimeFigureOut">
               <a:rPr lang="en-US" smtClean="0"/>
-              <a:t>1/14/2018</a:t>
+              <a:t>1/16/2018</a:t>
             </a:fld>
             <a:endParaRPr lang="en-US"/>
           </a:p>
@@ -661,7 +666,7 @@
     </p:spTree>
     <p:extLst>
       <p:ext uri="{BB962C8B-B14F-4D97-AF65-F5344CB8AC3E}">
-        <p14:creationId xmlns:p14="http://schemas.microsoft.com/office/powerpoint/2010/main" val="1394366699"/>
+        <p14:creationId xmlns:p14="http://schemas.microsoft.com/office/powerpoint/2010/main" val="3958463734"/>
       </p:ext>
     </p:extLst>
   </p:cSld>
@@ -745,7 +750,7 @@
     </p:spTree>
     <p:extLst>
       <p:ext uri="{BB962C8B-B14F-4D97-AF65-F5344CB8AC3E}">
-        <p14:creationId xmlns:p14="http://schemas.microsoft.com/office/powerpoint/2010/main" val="1667884131"/>
+        <p14:creationId xmlns:p14="http://schemas.microsoft.com/office/powerpoint/2010/main" val="2000614478"/>
       </p:ext>
     </p:extLst>
   </p:cSld>
@@ -829,7 +834,7 @@
     </p:spTree>
     <p:extLst>
       <p:ext uri="{BB962C8B-B14F-4D97-AF65-F5344CB8AC3E}">
-        <p14:creationId xmlns:p14="http://schemas.microsoft.com/office/powerpoint/2010/main" val="4069510992"/>
+        <p14:creationId xmlns:p14="http://schemas.microsoft.com/office/powerpoint/2010/main" val="1203969272"/>
       </p:ext>
     </p:extLst>
   </p:cSld>
@@ -905,6 +910,426 @@
             <a:fld id="{4E0E9D85-81CD-44C8-8F15-3AA06C34AF8C}" type="slidenum">
               <a:rPr lang="en-US" smtClean="0"/>
               <a:t>13</a:t>
+            </a:fld>
+            <a:endParaRPr lang="en-US"/>
+          </a:p>
+        </p:txBody>
+      </p:sp>
+    </p:spTree>
+    <p:extLst>
+      <p:ext uri="{BB962C8B-B14F-4D97-AF65-F5344CB8AC3E}">
+        <p14:creationId xmlns:p14="http://schemas.microsoft.com/office/powerpoint/2010/main" val="606166367"/>
+      </p:ext>
+    </p:extLst>
+  </p:cSld>
+  <p:clrMapOvr>
+    <a:masterClrMapping/>
+  </p:clrMapOvr>
+</p:notes>
+</file>
+
+<file path=ppt/notesSlides/notesSlide14.xml><?xml version="1.0" encoding="utf-8"?>
+<p:notes xmlns:a="http://schemas.openxmlformats.org/drawingml/2006/main" xmlns:r="http://schemas.openxmlformats.org/officeDocument/2006/relationships" xmlns:p="http://schemas.openxmlformats.org/presentationml/2006/main">
+  <p:cSld>
+    <p:spTree>
+      <p:nvGrpSpPr>
+        <p:cNvPr id="1" name=""/>
+        <p:cNvGrpSpPr/>
+        <p:nvPr/>
+      </p:nvGrpSpPr>
+      <p:grpSpPr>
+        <a:xfrm>
+          <a:off x="0" y="0"/>
+          <a:ext cx="0" cy="0"/>
+          <a:chOff x="0" y="0"/>
+          <a:chExt cx="0" cy="0"/>
+        </a:xfrm>
+      </p:grpSpPr>
+      <p:sp>
+        <p:nvSpPr>
+          <p:cNvPr id="2" name="Slide Image Placeholder 1"/>
+          <p:cNvSpPr>
+            <a:spLocks noGrp="1" noRot="1" noChangeAspect="1"/>
+          </p:cNvSpPr>
+          <p:nvPr>
+            <p:ph type="sldImg"/>
+          </p:nvPr>
+        </p:nvSpPr>
+        <p:spPr/>
+      </p:sp>
+      <p:sp>
+        <p:nvSpPr>
+          <p:cNvPr id="3" name="Notes Placeholder 2"/>
+          <p:cNvSpPr>
+            <a:spLocks noGrp="1"/>
+          </p:cNvSpPr>
+          <p:nvPr>
+            <p:ph type="body" idx="1"/>
+          </p:nvPr>
+        </p:nvSpPr>
+        <p:spPr/>
+        <p:txBody>
+          <a:bodyPr/>
+          <a:lstStyle/>
+          <a:p>
+            <a:endParaRPr lang="en-US"/>
+          </a:p>
+        </p:txBody>
+      </p:sp>
+      <p:sp>
+        <p:nvSpPr>
+          <p:cNvPr id="4" name="Slide Number Placeholder 3"/>
+          <p:cNvSpPr>
+            <a:spLocks noGrp="1"/>
+          </p:cNvSpPr>
+          <p:nvPr>
+            <p:ph type="sldNum" sz="quarter" idx="10"/>
+          </p:nvPr>
+        </p:nvSpPr>
+        <p:spPr/>
+        <p:txBody>
+          <a:bodyPr/>
+          <a:lstStyle/>
+          <a:p>
+            <a:fld id="{4E0E9D85-81CD-44C8-8F15-3AA06C34AF8C}" type="slidenum">
+              <a:rPr lang="en-US" smtClean="0"/>
+              <a:t>14</a:t>
+            </a:fld>
+            <a:endParaRPr lang="en-US"/>
+          </a:p>
+        </p:txBody>
+      </p:sp>
+    </p:spTree>
+    <p:extLst>
+      <p:ext uri="{BB962C8B-B14F-4D97-AF65-F5344CB8AC3E}">
+        <p14:creationId xmlns:p14="http://schemas.microsoft.com/office/powerpoint/2010/main" val="1394366699"/>
+      </p:ext>
+    </p:extLst>
+  </p:cSld>
+  <p:clrMapOvr>
+    <a:masterClrMapping/>
+  </p:clrMapOvr>
+</p:notes>
+</file>
+
+<file path=ppt/notesSlides/notesSlide15.xml><?xml version="1.0" encoding="utf-8"?>
+<p:notes xmlns:a="http://schemas.openxmlformats.org/drawingml/2006/main" xmlns:r="http://schemas.openxmlformats.org/officeDocument/2006/relationships" xmlns:p="http://schemas.openxmlformats.org/presentationml/2006/main">
+  <p:cSld>
+    <p:spTree>
+      <p:nvGrpSpPr>
+        <p:cNvPr id="1" name=""/>
+        <p:cNvGrpSpPr/>
+        <p:nvPr/>
+      </p:nvGrpSpPr>
+      <p:grpSpPr>
+        <a:xfrm>
+          <a:off x="0" y="0"/>
+          <a:ext cx="0" cy="0"/>
+          <a:chOff x="0" y="0"/>
+          <a:chExt cx="0" cy="0"/>
+        </a:xfrm>
+      </p:grpSpPr>
+      <p:sp>
+        <p:nvSpPr>
+          <p:cNvPr id="2" name="Slide Image Placeholder 1"/>
+          <p:cNvSpPr>
+            <a:spLocks noGrp="1" noRot="1" noChangeAspect="1"/>
+          </p:cNvSpPr>
+          <p:nvPr>
+            <p:ph type="sldImg"/>
+          </p:nvPr>
+        </p:nvSpPr>
+        <p:spPr/>
+      </p:sp>
+      <p:sp>
+        <p:nvSpPr>
+          <p:cNvPr id="3" name="Notes Placeholder 2"/>
+          <p:cNvSpPr>
+            <a:spLocks noGrp="1"/>
+          </p:cNvSpPr>
+          <p:nvPr>
+            <p:ph type="body" idx="1"/>
+          </p:nvPr>
+        </p:nvSpPr>
+        <p:spPr/>
+        <p:txBody>
+          <a:bodyPr/>
+          <a:lstStyle/>
+          <a:p>
+            <a:endParaRPr lang="en-US"/>
+          </a:p>
+        </p:txBody>
+      </p:sp>
+      <p:sp>
+        <p:nvSpPr>
+          <p:cNvPr id="4" name="Slide Number Placeholder 3"/>
+          <p:cNvSpPr>
+            <a:spLocks noGrp="1"/>
+          </p:cNvSpPr>
+          <p:nvPr>
+            <p:ph type="sldNum" sz="quarter" idx="10"/>
+          </p:nvPr>
+        </p:nvSpPr>
+        <p:spPr/>
+        <p:txBody>
+          <a:bodyPr/>
+          <a:lstStyle/>
+          <a:p>
+            <a:fld id="{4E0E9D85-81CD-44C8-8F15-3AA06C34AF8C}" type="slidenum">
+              <a:rPr lang="en-US" smtClean="0"/>
+              <a:t>15</a:t>
+            </a:fld>
+            <a:endParaRPr lang="en-US"/>
+          </a:p>
+        </p:txBody>
+      </p:sp>
+    </p:spTree>
+    <p:extLst>
+      <p:ext uri="{BB962C8B-B14F-4D97-AF65-F5344CB8AC3E}">
+        <p14:creationId xmlns:p14="http://schemas.microsoft.com/office/powerpoint/2010/main" val="2579647245"/>
+      </p:ext>
+    </p:extLst>
+  </p:cSld>
+  <p:clrMapOvr>
+    <a:masterClrMapping/>
+  </p:clrMapOvr>
+</p:notes>
+</file>
+
+<file path=ppt/notesSlides/notesSlide16.xml><?xml version="1.0" encoding="utf-8"?>
+<p:notes xmlns:a="http://schemas.openxmlformats.org/drawingml/2006/main" xmlns:r="http://schemas.openxmlformats.org/officeDocument/2006/relationships" xmlns:p="http://schemas.openxmlformats.org/presentationml/2006/main">
+  <p:cSld>
+    <p:spTree>
+      <p:nvGrpSpPr>
+        <p:cNvPr id="1" name=""/>
+        <p:cNvGrpSpPr/>
+        <p:nvPr/>
+      </p:nvGrpSpPr>
+      <p:grpSpPr>
+        <a:xfrm>
+          <a:off x="0" y="0"/>
+          <a:ext cx="0" cy="0"/>
+          <a:chOff x="0" y="0"/>
+          <a:chExt cx="0" cy="0"/>
+        </a:xfrm>
+      </p:grpSpPr>
+      <p:sp>
+        <p:nvSpPr>
+          <p:cNvPr id="2" name="Slide Image Placeholder 1"/>
+          <p:cNvSpPr>
+            <a:spLocks noGrp="1" noRot="1" noChangeAspect="1"/>
+          </p:cNvSpPr>
+          <p:nvPr>
+            <p:ph type="sldImg"/>
+          </p:nvPr>
+        </p:nvSpPr>
+        <p:spPr/>
+      </p:sp>
+      <p:sp>
+        <p:nvSpPr>
+          <p:cNvPr id="3" name="Notes Placeholder 2"/>
+          <p:cNvSpPr>
+            <a:spLocks noGrp="1"/>
+          </p:cNvSpPr>
+          <p:nvPr>
+            <p:ph type="body" idx="1"/>
+          </p:nvPr>
+        </p:nvSpPr>
+        <p:spPr/>
+        <p:txBody>
+          <a:bodyPr/>
+          <a:lstStyle/>
+          <a:p>
+            <a:endParaRPr lang="en-US"/>
+          </a:p>
+        </p:txBody>
+      </p:sp>
+      <p:sp>
+        <p:nvSpPr>
+          <p:cNvPr id="4" name="Slide Number Placeholder 3"/>
+          <p:cNvSpPr>
+            <a:spLocks noGrp="1"/>
+          </p:cNvSpPr>
+          <p:nvPr>
+            <p:ph type="sldNum" sz="quarter" idx="10"/>
+          </p:nvPr>
+        </p:nvSpPr>
+        <p:spPr/>
+        <p:txBody>
+          <a:bodyPr/>
+          <a:lstStyle/>
+          <a:p>
+            <a:fld id="{4E0E9D85-81CD-44C8-8F15-3AA06C34AF8C}" type="slidenum">
+              <a:rPr lang="en-US" smtClean="0"/>
+              <a:t>16</a:t>
+            </a:fld>
+            <a:endParaRPr lang="en-US"/>
+          </a:p>
+        </p:txBody>
+      </p:sp>
+    </p:spTree>
+    <p:extLst>
+      <p:ext uri="{BB962C8B-B14F-4D97-AF65-F5344CB8AC3E}">
+        <p14:creationId xmlns:p14="http://schemas.microsoft.com/office/powerpoint/2010/main" val="2136502169"/>
+      </p:ext>
+    </p:extLst>
+  </p:cSld>
+  <p:clrMapOvr>
+    <a:masterClrMapping/>
+  </p:clrMapOvr>
+</p:notes>
+</file>
+
+<file path=ppt/notesSlides/notesSlide17.xml><?xml version="1.0" encoding="utf-8"?>
+<p:notes xmlns:a="http://schemas.openxmlformats.org/drawingml/2006/main" xmlns:r="http://schemas.openxmlformats.org/officeDocument/2006/relationships" xmlns:p="http://schemas.openxmlformats.org/presentationml/2006/main">
+  <p:cSld>
+    <p:spTree>
+      <p:nvGrpSpPr>
+        <p:cNvPr id="1" name=""/>
+        <p:cNvGrpSpPr/>
+        <p:nvPr/>
+      </p:nvGrpSpPr>
+      <p:grpSpPr>
+        <a:xfrm>
+          <a:off x="0" y="0"/>
+          <a:ext cx="0" cy="0"/>
+          <a:chOff x="0" y="0"/>
+          <a:chExt cx="0" cy="0"/>
+        </a:xfrm>
+      </p:grpSpPr>
+      <p:sp>
+        <p:nvSpPr>
+          <p:cNvPr id="2" name="Slide Image Placeholder 1"/>
+          <p:cNvSpPr>
+            <a:spLocks noGrp="1" noRot="1" noChangeAspect="1"/>
+          </p:cNvSpPr>
+          <p:nvPr>
+            <p:ph type="sldImg"/>
+          </p:nvPr>
+        </p:nvSpPr>
+        <p:spPr/>
+      </p:sp>
+      <p:sp>
+        <p:nvSpPr>
+          <p:cNvPr id="3" name="Notes Placeholder 2"/>
+          <p:cNvSpPr>
+            <a:spLocks noGrp="1"/>
+          </p:cNvSpPr>
+          <p:nvPr>
+            <p:ph type="body" idx="1"/>
+          </p:nvPr>
+        </p:nvSpPr>
+        <p:spPr/>
+        <p:txBody>
+          <a:bodyPr/>
+          <a:lstStyle/>
+          <a:p>
+            <a:endParaRPr lang="en-US"/>
+          </a:p>
+        </p:txBody>
+      </p:sp>
+      <p:sp>
+        <p:nvSpPr>
+          <p:cNvPr id="4" name="Slide Number Placeholder 3"/>
+          <p:cNvSpPr>
+            <a:spLocks noGrp="1"/>
+          </p:cNvSpPr>
+          <p:nvPr>
+            <p:ph type="sldNum" sz="quarter" idx="10"/>
+          </p:nvPr>
+        </p:nvSpPr>
+        <p:spPr/>
+        <p:txBody>
+          <a:bodyPr/>
+          <a:lstStyle/>
+          <a:p>
+            <a:fld id="{4E0E9D85-81CD-44C8-8F15-3AA06C34AF8C}" type="slidenum">
+              <a:rPr lang="en-US" smtClean="0"/>
+              <a:t>17</a:t>
+            </a:fld>
+            <a:endParaRPr lang="en-US"/>
+          </a:p>
+        </p:txBody>
+      </p:sp>
+    </p:spTree>
+    <p:extLst>
+      <p:ext uri="{BB962C8B-B14F-4D97-AF65-F5344CB8AC3E}">
+        <p14:creationId xmlns:p14="http://schemas.microsoft.com/office/powerpoint/2010/main" val="1292765135"/>
+      </p:ext>
+    </p:extLst>
+  </p:cSld>
+  <p:clrMapOvr>
+    <a:masterClrMapping/>
+  </p:clrMapOvr>
+</p:notes>
+</file>
+
+<file path=ppt/notesSlides/notesSlide18.xml><?xml version="1.0" encoding="utf-8"?>
+<p:notes xmlns:a="http://schemas.openxmlformats.org/drawingml/2006/main" xmlns:r="http://schemas.openxmlformats.org/officeDocument/2006/relationships" xmlns:p="http://schemas.openxmlformats.org/presentationml/2006/main">
+  <p:cSld>
+    <p:spTree>
+      <p:nvGrpSpPr>
+        <p:cNvPr id="1" name=""/>
+        <p:cNvGrpSpPr/>
+        <p:nvPr/>
+      </p:nvGrpSpPr>
+      <p:grpSpPr>
+        <a:xfrm>
+          <a:off x="0" y="0"/>
+          <a:ext cx="0" cy="0"/>
+          <a:chOff x="0" y="0"/>
+          <a:chExt cx="0" cy="0"/>
+        </a:xfrm>
+      </p:grpSpPr>
+      <p:sp>
+        <p:nvSpPr>
+          <p:cNvPr id="2" name="Slide Image Placeholder 1"/>
+          <p:cNvSpPr>
+            <a:spLocks noGrp="1" noRot="1" noChangeAspect="1"/>
+          </p:cNvSpPr>
+          <p:nvPr>
+            <p:ph type="sldImg"/>
+          </p:nvPr>
+        </p:nvSpPr>
+        <p:spPr/>
+      </p:sp>
+      <p:sp>
+        <p:nvSpPr>
+          <p:cNvPr id="3" name="Notes Placeholder 2"/>
+          <p:cNvSpPr>
+            <a:spLocks noGrp="1"/>
+          </p:cNvSpPr>
+          <p:nvPr>
+            <p:ph type="body" idx="1"/>
+          </p:nvPr>
+        </p:nvSpPr>
+        <p:spPr/>
+        <p:txBody>
+          <a:bodyPr/>
+          <a:lstStyle/>
+          <a:p>
+            <a:endParaRPr lang="en-US"/>
+          </a:p>
+        </p:txBody>
+      </p:sp>
+      <p:sp>
+        <p:nvSpPr>
+          <p:cNvPr id="4" name="Slide Number Placeholder 3"/>
+          <p:cNvSpPr>
+            <a:spLocks noGrp="1"/>
+          </p:cNvSpPr>
+          <p:nvPr>
+            <p:ph type="sldNum" sz="quarter" idx="10"/>
+          </p:nvPr>
+        </p:nvSpPr>
+        <p:spPr/>
+        <p:txBody>
+          <a:bodyPr/>
+          <a:lstStyle/>
+          <a:p>
+            <a:fld id="{4E0E9D85-81CD-44C8-8F15-3AA06C34AF8C}" type="slidenum">
+              <a:rPr lang="en-US" smtClean="0"/>
+              <a:t>18</a:t>
             </a:fld>
             <a:endParaRPr lang="en-US"/>
           </a:p>
@@ -1501,7 +1926,7 @@
     </p:spTree>
     <p:extLst>
       <p:ext uri="{BB962C8B-B14F-4D97-AF65-F5344CB8AC3E}">
-        <p14:creationId xmlns:p14="http://schemas.microsoft.com/office/powerpoint/2010/main" val="2000614478"/>
+        <p14:creationId xmlns:p14="http://schemas.microsoft.com/office/powerpoint/2010/main" val="834080314"/>
       </p:ext>
     </p:extLst>
   </p:cSld>
@@ -1585,7 +2010,7 @@
     </p:spTree>
     <p:extLst>
       <p:ext uri="{BB962C8B-B14F-4D97-AF65-F5344CB8AC3E}">
-        <p14:creationId xmlns:p14="http://schemas.microsoft.com/office/powerpoint/2010/main" val="834080314"/>
+        <p14:creationId xmlns:p14="http://schemas.microsoft.com/office/powerpoint/2010/main" val="3346934726"/>
       </p:ext>
     </p:extLst>
   </p:cSld>
@@ -2127,7 +2552,7 @@
               <a:pPr>
                 <a:defRPr/>
               </a:pPr>
-              <a:t>1/14/2018</a:t>
+              <a:t>1/16/2018</a:t>
             </a:fld>
             <a:endParaRPr lang="en-US"/>
           </a:p>
@@ -2312,7 +2737,7 @@
           <a:p>
             <a:fld id="{DFF43710-F8AB-6840-B03A-23D4C2B2884A}" type="datetimeFigureOut">
               <a:rPr lang="en-US" smtClean="0"/>
-              <a:t>1/14/2018</a:t>
+              <a:t>1/16/2018</a:t>
             </a:fld>
             <a:endParaRPr lang="en-US"/>
           </a:p>
@@ -2557,7 +2982,7 @@
               <a:pPr defTabSz="914400">
                 <a:defRPr/>
               </a:pPr>
-              <a:t>1/14/2018</a:t>
+              <a:t>1/16/2018</a:t>
             </a:fld>
             <a:endParaRPr lang="en-US"/>
           </a:p>
@@ -3839,7 +4264,7 @@
         </p:nvSpPr>
         <p:spPr>
           <a:xfrm>
-            <a:off x="9111" y="0"/>
+            <a:off x="0" y="140672"/>
             <a:ext cx="9144000" cy="589085"/>
           </a:xfrm>
         </p:spPr>
@@ -3851,7 +4276,7 @@
           <a:p>
             <a:r>
               <a:rPr lang="en-US" dirty="0"/>
-              <a:t>Using GitHub</a:t>
+              <a:t>git – Push &amp; Pull</a:t>
             </a:r>
             <a:endParaRPr lang="en-US" b="0" dirty="0"/>
           </a:p>
@@ -3869,8 +4294,8 @@
         </p:nvSpPr>
         <p:spPr>
           <a:xfrm>
-            <a:off x="276639" y="653144"/>
-            <a:ext cx="8608944" cy="5580508"/>
+            <a:off x="276639" y="992776"/>
+            <a:ext cx="8608944" cy="5240875"/>
           </a:xfrm>
         </p:spPr>
         <p:txBody>
@@ -3881,194 +4306,120 @@
           <a:p>
             <a:r>
               <a:rPr lang="en-US" dirty="0"/>
-              <a:t>GitHub &amp; Bitbucket are two of the largest web-based hosting services</a:t>
-            </a:r>
-          </a:p>
-          <a:p>
-            <a:pPr lvl="1"/>
-            <a:endParaRPr lang="en-US" dirty="0"/>
-          </a:p>
-          <a:p>
-            <a:pPr lvl="1"/>
-            <a:r>
-              <a:rPr lang="en-US" dirty="0"/>
-              <a:t>they are targeted towards software development projects</a:t>
+              <a:t>Pull – performs a ‘fetch’ and ‘merge’ in one step</a:t>
+            </a:r>
+          </a:p>
+          <a:p>
+            <a:pPr lvl="1"/>
+            <a:r>
+              <a:rPr lang="en-US" dirty="0"/>
+              <a:t>pull the remote tracking branch into the current working directory</a:t>
             </a:r>
           </a:p>
           <a:p>
             <a:pPr lvl="2"/>
             <a:r>
               <a:rPr lang="en-US" dirty="0"/>
-              <a:t>can be used for proposals, papers or any collection of documents</a:t>
-            </a:r>
-          </a:p>
-          <a:p>
-            <a:pPr lvl="1"/>
-            <a:r>
-              <a:rPr lang="en-US" dirty="0"/>
-              <a:t>neither supports Subversion (SVN)</a:t>
+              <a:t>if you clone a repo, it’s ‘master’ is your ‘remote tracking branch’</a:t>
             </a:r>
           </a:p>
           <a:p>
             <a:pPr lvl="2"/>
             <a:r>
               <a:rPr lang="en-US" dirty="0"/>
-              <a:t>GitHub exclusively supports </a:t>
-            </a:r>
-            <a:r>
-              <a:rPr lang="en-US" b="0" dirty="0">
-                <a:solidFill>
-                  <a:schemeClr val="tx1"/>
-                </a:solidFill>
+              <a:t>we do not discuss ‘fetch’ and ‘merge’ here</a:t>
+            </a:r>
+          </a:p>
+          <a:p>
+            <a:pPr marL="739775" indent="0">
+              <a:buNone/>
+            </a:pPr>
+            <a:r>
+              <a:rPr lang="en-US" dirty="0">
                 <a:latin typeface="Courier New" panose="02070309020205020404" pitchFamily="49" charset="0"/>
                 <a:cs typeface="Courier New" panose="02070309020205020404" pitchFamily="49" charset="0"/>
               </a:rPr>
-              <a:t>git</a:t>
-            </a:r>
-            <a:r>
-              <a:rPr lang="en-US" dirty="0"/>
-              <a:t>;  Bitbucket supports </a:t>
-            </a:r>
-            <a:r>
-              <a:rPr lang="en-US" sz="1600" b="0" dirty="0">
-                <a:solidFill>
-                  <a:schemeClr val="tx1"/>
-                </a:solidFill>
+              <a:t>$ git pull</a:t>
+            </a:r>
+          </a:p>
+          <a:p>
+            <a:endParaRPr lang="en-US" dirty="0"/>
+          </a:p>
+          <a:p>
+            <a:endParaRPr lang="en-US" dirty="0"/>
+          </a:p>
+          <a:p>
+            <a:r>
+              <a:rPr lang="en-US" dirty="0"/>
+              <a:t>Push – send changes from the local branch to a remote repo</a:t>
+            </a:r>
+          </a:p>
+          <a:p>
+            <a:pPr lvl="1"/>
+            <a:r>
+              <a:rPr lang="en-US" dirty="0"/>
+              <a:t>push to the remote tracking branch</a:t>
+            </a:r>
+          </a:p>
+          <a:p>
+            <a:pPr marL="739775" indent="0">
+              <a:buNone/>
+            </a:pPr>
+            <a:r>
+              <a:rPr lang="en-US" dirty="0">
                 <a:latin typeface="Courier New" panose="02070309020205020404" pitchFamily="49" charset="0"/>
                 <a:cs typeface="Courier New" panose="02070309020205020404" pitchFamily="49" charset="0"/>
               </a:rPr>
-              <a:t>git</a:t>
-            </a:r>
-            <a:r>
-              <a:rPr lang="en-US" dirty="0"/>
-              <a:t> and </a:t>
-            </a:r>
-            <a:r>
-              <a:rPr lang="en-US" sz="1600" b="0" dirty="0">
-                <a:solidFill>
-                  <a:schemeClr val="tx1"/>
-                </a:solidFill>
+              <a:t>$ git push</a:t>
+            </a:r>
+          </a:p>
+          <a:p>
+            <a:endParaRPr lang="en-US" dirty="0"/>
+          </a:p>
+          <a:p>
+            <a:endParaRPr lang="en-US" dirty="0"/>
+          </a:p>
+          <a:p>
+            <a:r>
+              <a:rPr lang="en-US" dirty="0"/>
+              <a:t>There are many sophisticated uses of  </a:t>
+            </a:r>
+            <a:r>
+              <a:rPr lang="en-US" dirty="0">
                 <a:latin typeface="Courier New" panose="02070309020205020404" pitchFamily="49" charset="0"/>
                 <a:cs typeface="Courier New" panose="02070309020205020404" pitchFamily="49" charset="0"/>
               </a:rPr>
-              <a:t>mercurial</a:t>
-            </a:r>
-            <a:endParaRPr lang="en-US" b="0" dirty="0">
-              <a:solidFill>
-                <a:schemeClr val="tx1"/>
-              </a:solidFill>
+              <a:t>push </a:t>
+            </a:r>
+            <a:r>
+              <a:rPr lang="en-US" dirty="0"/>
+              <a:t> &amp;  </a:t>
+            </a:r>
+            <a:r>
+              <a:rPr lang="en-US" dirty="0">
+                <a:latin typeface="Courier New" panose="02070309020205020404" pitchFamily="49" charset="0"/>
+                <a:cs typeface="Courier New" panose="02070309020205020404" pitchFamily="49" charset="0"/>
+              </a:rPr>
+              <a:t>pull </a:t>
+            </a:r>
+          </a:p>
+          <a:p>
+            <a:pPr lvl="1"/>
+            <a:r>
+              <a:rPr lang="en-US" dirty="0"/>
+              <a:t>e.g. one can push to (or pull from) arbitrary branches in remote repos</a:t>
+            </a:r>
+            <a:endParaRPr lang="en-US" sz="1700" dirty="0"/>
+          </a:p>
+          <a:p>
+            <a:pPr marL="801688" indent="0">
+              <a:buNone/>
+            </a:pPr>
+            <a:endParaRPr lang="en-US" sz="1600" dirty="0">
               <a:latin typeface="Courier New" panose="02070309020205020404" pitchFamily="49" charset="0"/>
               <a:cs typeface="Courier New" panose="02070309020205020404" pitchFamily="49" charset="0"/>
             </a:endParaRPr>
           </a:p>
-          <a:p>
-            <a:r>
-              <a:rPr lang="en-US" dirty="0"/>
-              <a:t>GitHub provides the following features (and more):</a:t>
-            </a:r>
-          </a:p>
-          <a:p>
-            <a:pPr lvl="1"/>
-            <a:r>
-              <a:rPr lang="en-US" dirty="0"/>
-              <a:t>an integrated issue tracker</a:t>
-            </a:r>
-          </a:p>
-          <a:p>
-            <a:pPr lvl="1"/>
-            <a:r>
-              <a:rPr lang="en-US" dirty="0"/>
-              <a:t>branch comparison views</a:t>
-            </a:r>
-          </a:p>
-          <a:p>
-            <a:pPr lvl="1"/>
-            <a:r>
-              <a:rPr lang="en-US" dirty="0"/>
-              <a:t>native applications for Windows and Mac desktops</a:t>
-            </a:r>
-          </a:p>
-          <a:p>
-            <a:pPr lvl="2"/>
-            <a:r>
-              <a:rPr lang="en-US" dirty="0"/>
-              <a:t>https://desktop.github.com/</a:t>
-            </a:r>
-          </a:p>
-          <a:p>
-            <a:pPr lvl="1"/>
-            <a:r>
-              <a:rPr lang="en-US" dirty="0"/>
-              <a:t>support for over 200 programming languages and data formats</a:t>
-            </a:r>
-          </a:p>
-          <a:p>
-            <a:pPr lvl="1"/>
-            <a:r>
-              <a:rPr lang="en-US" dirty="0"/>
-              <a:t>GitHub pages, a feature for publishing and hosting</a:t>
-            </a:r>
-          </a:p>
-          <a:p>
-            <a:pPr lvl="1"/>
-            <a:r>
-              <a:rPr lang="en-US" dirty="0"/>
-              <a:t>SSL, SSH &amp; https for data transmission;  two-factor authentication for login</a:t>
-            </a:r>
-          </a:p>
-          <a:p>
-            <a:pPr lvl="1"/>
-            <a:r>
-              <a:rPr lang="en-US" dirty="0"/>
-              <a:t>API integration for 3</a:t>
-            </a:r>
-            <a:r>
-              <a:rPr lang="en-US" baseline="30000" dirty="0"/>
-              <a:t>rd</a:t>
-            </a:r>
-            <a:r>
-              <a:rPr lang="en-US" dirty="0"/>
-              <a:t>-party tool and other platforms</a:t>
-            </a:r>
-          </a:p>
-          <a:p>
-            <a:pPr lvl="1"/>
-            <a:r>
-              <a:rPr lang="en-US" dirty="0"/>
-              <a:t>partial support is provided for </a:t>
-            </a:r>
-            <a:r>
-              <a:rPr lang="en-US" sz="1800" dirty="0">
-                <a:solidFill>
-                  <a:schemeClr val="tx1"/>
-                </a:solidFill>
-                <a:latin typeface="Courier New" panose="02070309020205020404" pitchFamily="49" charset="0"/>
-                <a:cs typeface="Courier New" panose="02070309020205020404" pitchFamily="49" charset="0"/>
-              </a:rPr>
-              <a:t>SVN</a:t>
-            </a:r>
-            <a:endParaRPr lang="en-US" dirty="0">
-              <a:solidFill>
-                <a:schemeClr val="tx1"/>
-              </a:solidFill>
-              <a:latin typeface="Courier New" panose="02070309020205020404" pitchFamily="49" charset="0"/>
-              <a:cs typeface="Courier New" panose="02070309020205020404" pitchFamily="49" charset="0"/>
-            </a:endParaRPr>
-          </a:p>
-          <a:p>
-            <a:pPr lvl="2"/>
-            <a:r>
-              <a:rPr lang="en-US" dirty="0"/>
-              <a:t>import SVN repos into git</a:t>
-            </a:r>
-          </a:p>
-          <a:p>
-            <a:pPr lvl="2"/>
-            <a:r>
-              <a:rPr lang="en-US" dirty="0"/>
-              <a:t>GitHub repos can be cloned directly via the SVN client.</a:t>
-            </a:r>
-          </a:p>
         </p:txBody>
       </p:sp>
       <p:sp>
@@ -4076,7 +4427,7 @@
           <p:cNvPr id="4" name="TextBox 3">
             <a:extLst>
               <a:ext uri="{FF2B5EF4-FFF2-40B4-BE49-F238E27FC236}">
-                <a16:creationId xmlns:a16="http://schemas.microsoft.com/office/drawing/2014/main" id="{97DE75EA-783B-4A37-9C7A-39FAED9F70AD}"/>
+                <a16:creationId xmlns:a16="http://schemas.microsoft.com/office/drawing/2014/main" id="{B601D247-3D75-4D67-842C-20FDCCCA9524}"/>
               </a:ext>
             </a:extLst>
           </p:cNvPr>
@@ -4085,13 +4436,18 @@
         </p:nvSpPr>
         <p:spPr>
           <a:xfrm>
-            <a:off x="2540063" y="968229"/>
-            <a:ext cx="6603937" cy="338554"/>
+            <a:off x="4878220" y="3867886"/>
+            <a:ext cx="4007363" cy="307777"/>
           </a:xfrm>
           <a:prstGeom prst="rect">
             <a:avLst/>
           </a:prstGeom>
           <a:noFill/>
+          <a:ln>
+            <a:solidFill>
+              <a:schemeClr val="tx1"/>
+            </a:solidFill>
+          </a:ln>
         </p:spPr>
         <p:txBody>
           <a:bodyPr wrap="square" rtlCol="0">
@@ -4105,26 +4461,89 @@
               </a:spcBef>
             </a:pPr>
             <a:r>
-              <a:rPr lang="en-US" sz="1600" dirty="0">
+              <a:rPr lang="en-US" sz="1400" dirty="0">
                 <a:latin typeface="Times New Roman" panose="02020603050405020304" pitchFamily="18" charset="0"/>
                 <a:cs typeface="Times New Roman" panose="02020603050405020304" pitchFamily="18" charset="0"/>
               </a:rPr>
-              <a:t>for a comparison, see  </a:t>
-            </a:r>
-            <a:r>
-              <a:rPr lang="en-US" sz="1600" dirty="0">
+              <a:t>Docs for ‘git push’, </a:t>
+            </a:r>
+            <a:r>
+              <a:rPr lang="en-US" sz="1400" dirty="0">
                 <a:latin typeface="Times New Roman" panose="02020603050405020304" pitchFamily="18" charset="0"/>
                 <a:cs typeface="Times New Roman" panose="02020603050405020304" pitchFamily="18" charset="0"/>
                 <a:hlinkClick r:id="rId3"/>
               </a:rPr>
-              <a:t>https://www.upguard.com/articles/github-vs-bitbucket</a:t>
-            </a:r>
-            <a:r>
-              <a:rPr lang="en-US" sz="1600" dirty="0">
+              <a:t>https://git-scm.com/docs/git-push</a:t>
+            </a:r>
+            <a:r>
+              <a:rPr lang="en-US" sz="1400" dirty="0">
                 <a:latin typeface="Times New Roman" panose="02020603050405020304" pitchFamily="18" charset="0"/>
                 <a:cs typeface="Times New Roman" panose="02020603050405020304" pitchFamily="18" charset="0"/>
               </a:rPr>
-              <a:t>  </a:t>
+              <a:t> </a:t>
+            </a:r>
+          </a:p>
+        </p:txBody>
+      </p:sp>
+      <p:sp>
+        <p:nvSpPr>
+          <p:cNvPr id="6" name="TextBox 5">
+            <a:extLst>
+              <a:ext uri="{FF2B5EF4-FFF2-40B4-BE49-F238E27FC236}">
+                <a16:creationId xmlns:a16="http://schemas.microsoft.com/office/drawing/2014/main" id="{A0A85E2C-31A2-48DB-8ABA-DBCB3DCA7F3D}"/>
+              </a:ext>
+            </a:extLst>
+          </p:cNvPr>
+          <p:cNvSpPr txBox="1"/>
+          <p:nvPr/>
+        </p:nvSpPr>
+        <p:spPr>
+          <a:xfrm>
+            <a:off x="4859998" y="2142806"/>
+            <a:ext cx="4007363" cy="307777"/>
+          </a:xfrm>
+          <a:prstGeom prst="rect">
+            <a:avLst/>
+          </a:prstGeom>
+          <a:noFill/>
+          <a:ln>
+            <a:solidFill>
+              <a:schemeClr val="tx1"/>
+            </a:solidFill>
+          </a:ln>
+        </p:spPr>
+        <p:txBody>
+          <a:bodyPr wrap="square" rtlCol="0">
+            <a:spAutoFit/>
+          </a:bodyPr>
+          <a:lstStyle/>
+          <a:p>
+            <a:pPr marL="227013" indent="-227013">
+              <a:spcBef>
+                <a:spcPts val="300"/>
+              </a:spcBef>
+            </a:pPr>
+            <a:r>
+              <a:rPr lang="en-US" sz="1400" dirty="0">
+                <a:latin typeface="Times New Roman" panose="02020603050405020304" pitchFamily="18" charset="0"/>
+                <a:cs typeface="Times New Roman" panose="02020603050405020304" pitchFamily="18" charset="0"/>
+              </a:rPr>
+              <a:t>Docs for ‘git pull’, </a:t>
+            </a:r>
+            <a:r>
+              <a:rPr lang="en-US" sz="1400" dirty="0">
+                <a:latin typeface="Times New Roman" panose="02020603050405020304" pitchFamily="18" charset="0"/>
+                <a:cs typeface="Times New Roman" panose="02020603050405020304" pitchFamily="18" charset="0"/>
+                <a:hlinkClick r:id="rId4"/>
+              </a:rPr>
+              <a:t>https://git-scm.com/docs/git-pull</a:t>
+            </a:r>
+            <a:r>
+              <a:rPr lang="en-US" sz="1400" dirty="0">
+                <a:latin typeface="Times New Roman" panose="02020603050405020304" pitchFamily="18" charset="0"/>
+                <a:cs typeface="Times New Roman" panose="02020603050405020304" pitchFamily="18" charset="0"/>
+              </a:rPr>
+              <a:t> </a:t>
             </a:r>
           </a:p>
         </p:txBody>
@@ -4132,7 +4551,7 @@
     </p:spTree>
     <p:extLst>
       <p:ext uri="{BB962C8B-B14F-4D97-AF65-F5344CB8AC3E}">
-        <p14:creationId xmlns:p14="http://schemas.microsoft.com/office/powerpoint/2010/main" val="2274151764"/>
+        <p14:creationId xmlns:p14="http://schemas.microsoft.com/office/powerpoint/2010/main" val="3008153212"/>
       </p:ext>
     </p:extLst>
   </p:cSld>
@@ -4159,41 +4578,329 @@
           <a:chExt cx="0" cy="0"/>
         </a:xfrm>
       </p:grpSpPr>
-      <p:pic>
-        <p:nvPicPr>
-          <p:cNvPr id="8" name="Picture 7">
+      <p:sp>
+        <p:nvSpPr>
+          <p:cNvPr id="2" name="Title 1"/>
+          <p:cNvSpPr>
+            <a:spLocks noGrp="1"/>
+          </p:cNvSpPr>
+          <p:nvPr>
+            <p:ph type="title"/>
+          </p:nvPr>
+        </p:nvSpPr>
+        <p:spPr>
+          <a:xfrm>
+            <a:off x="0" y="44873"/>
+            <a:ext cx="9144000" cy="589085"/>
+          </a:xfrm>
+        </p:spPr>
+        <p:txBody>
+          <a:bodyPr>
+            <a:normAutofit/>
+          </a:bodyPr>
+          <a:lstStyle/>
+          <a:p>
+            <a:r>
+              <a:rPr lang="en-US" dirty="0"/>
+              <a:t>git – Creating a Branch</a:t>
+            </a:r>
+            <a:endParaRPr lang="en-US" b="0" dirty="0"/>
+          </a:p>
+        </p:txBody>
+      </p:sp>
+      <p:sp>
+        <p:nvSpPr>
+          <p:cNvPr id="3" name="Content Placeholder 2"/>
+          <p:cNvSpPr>
+            <a:spLocks noGrp="1"/>
+          </p:cNvSpPr>
+          <p:nvPr>
+            <p:ph idx="1"/>
+          </p:nvPr>
+        </p:nvSpPr>
+        <p:spPr>
+          <a:xfrm>
+            <a:off x="276639" y="670552"/>
+            <a:ext cx="8608944" cy="5406337"/>
+          </a:xfrm>
+        </p:spPr>
+        <p:txBody>
+          <a:bodyPr>
+            <a:normAutofit lnSpcReduction="10000"/>
+          </a:bodyPr>
+          <a:lstStyle/>
+          <a:p>
+            <a:r>
+              <a:rPr lang="en-US" dirty="0"/>
+              <a:t>A branch tracks a set of (logically connected) changes</a:t>
+            </a:r>
+          </a:p>
+          <a:p>
+            <a:pPr lvl="1"/>
+            <a:r>
+              <a:rPr lang="en-US" dirty="0"/>
+              <a:t>no conflicts with concurrent modifications to the same part of the repo</a:t>
+            </a:r>
+          </a:p>
+          <a:p>
+            <a:pPr lvl="2"/>
+            <a:r>
+              <a:rPr lang="en-US" dirty="0"/>
+              <a:t>conflicts can manifest when merging two branches with overlapping changes</a:t>
+            </a:r>
+          </a:p>
+          <a:p>
+            <a:pPr lvl="1"/>
+            <a:r>
+              <a:rPr lang="en-US" dirty="0"/>
+              <a:t>a branch is a ref</a:t>
+            </a:r>
+          </a:p>
+          <a:p>
+            <a:pPr lvl="2"/>
+            <a:r>
+              <a:rPr lang="en-US" dirty="0"/>
+              <a:t>points to latest commit in corresponding ‘branch’ of the commit tree</a:t>
+            </a:r>
+          </a:p>
+          <a:p>
+            <a:r>
+              <a:rPr lang="en-US" dirty="0"/>
+              <a:t>In our example repo (see figure on slide #6), we start with two branches</a:t>
+            </a:r>
+          </a:p>
+          <a:p>
+            <a:pPr lvl="1"/>
+            <a:r>
+              <a:rPr lang="en-US" dirty="0">
+                <a:solidFill>
+                  <a:schemeClr val="tx1"/>
+                </a:solidFill>
+                <a:latin typeface="Courier New" panose="02070309020205020404" pitchFamily="49" charset="0"/>
+                <a:cs typeface="Courier New" panose="02070309020205020404" pitchFamily="49" charset="0"/>
+              </a:rPr>
+              <a:t>my_branch</a:t>
+            </a:r>
+            <a:r>
+              <a:rPr lang="en-US" dirty="0"/>
+              <a:t>  &amp;  </a:t>
+            </a:r>
+            <a:r>
+              <a:rPr lang="en-US" dirty="0">
+                <a:solidFill>
+                  <a:schemeClr val="tx1"/>
+                </a:solidFill>
+                <a:latin typeface="Courier New" panose="02070309020205020404" pitchFamily="49" charset="0"/>
+                <a:cs typeface="Courier New" panose="02070309020205020404" pitchFamily="49" charset="0"/>
+              </a:rPr>
+              <a:t>master</a:t>
+            </a:r>
+          </a:p>
+          <a:p>
+            <a:pPr lvl="1"/>
+            <a:r>
+              <a:rPr lang="en-US" dirty="0"/>
+              <a:t>both initially point to the same address, </a:t>
+            </a:r>
+            <a:r>
+              <a:rPr lang="en-US" sz="1800" dirty="0">
+                <a:solidFill>
+                  <a:schemeClr val="tx1"/>
+                </a:solidFill>
+                <a:latin typeface="Courier New" panose="02070309020205020404" pitchFamily="49" charset="0"/>
+                <a:cs typeface="Courier New" panose="02070309020205020404" pitchFamily="49" charset="0"/>
+              </a:rPr>
+              <a:t>2d52a68</a:t>
+            </a:r>
+            <a:endParaRPr lang="en-US" dirty="0"/>
+          </a:p>
+          <a:p>
+            <a:pPr lvl="1"/>
+            <a:r>
+              <a:rPr lang="en-US" dirty="0"/>
+              <a:t>after changes in each branch occur separately, we see they have diverged</a:t>
+            </a:r>
+          </a:p>
+          <a:p>
+            <a:pPr lvl="2"/>
+            <a:r>
+              <a:rPr lang="en-US" dirty="0"/>
+              <a:t>addresses </a:t>
+            </a:r>
+            <a:r>
+              <a:rPr lang="en-US" sz="1600" b="0" dirty="0">
+                <a:solidFill>
+                  <a:schemeClr val="tx1"/>
+                </a:solidFill>
+                <a:latin typeface="Courier New" panose="02070309020205020404" pitchFamily="49" charset="0"/>
+                <a:cs typeface="Courier New" panose="02070309020205020404" pitchFamily="49" charset="0"/>
+              </a:rPr>
+              <a:t>243742d</a:t>
+            </a:r>
+            <a:r>
+              <a:rPr lang="en-US" dirty="0"/>
+              <a:t>  &amp;  </a:t>
+            </a:r>
+            <a:r>
+              <a:rPr lang="en-US" sz="1600" b="0" dirty="0">
+                <a:solidFill>
+                  <a:schemeClr val="tx1"/>
+                </a:solidFill>
+                <a:latin typeface="Courier New" panose="02070309020205020404" pitchFamily="49" charset="0"/>
+                <a:cs typeface="Courier New" panose="02070309020205020404" pitchFamily="49" charset="0"/>
+              </a:rPr>
+              <a:t>04d25ed</a:t>
+            </a:r>
+            <a:r>
+              <a:rPr lang="en-US" dirty="0"/>
+              <a:t> respectively.</a:t>
+            </a:r>
+          </a:p>
+          <a:p>
+            <a:r>
+              <a:rPr lang="en-US" dirty="0"/>
+              <a:t>Examples of using the branch command:</a:t>
+            </a:r>
+          </a:p>
+          <a:p>
+            <a:pPr lvl="1"/>
+            <a:r>
+              <a:rPr lang="en-US" dirty="0"/>
+              <a:t>Create new branch  </a:t>
+            </a:r>
+            <a:r>
+              <a:rPr lang="en-US" sz="1800" dirty="0">
+                <a:solidFill>
+                  <a:schemeClr val="tx1"/>
+                </a:solidFill>
+                <a:latin typeface="Courier New" panose="02070309020205020404" pitchFamily="49" charset="0"/>
+                <a:cs typeface="Courier New" panose="02070309020205020404" pitchFamily="49" charset="0"/>
+              </a:rPr>
+              <a:t>branch_name</a:t>
+            </a:r>
+            <a:r>
+              <a:rPr lang="en-US" dirty="0"/>
+              <a:t>  pointing to same address as  </a:t>
+            </a:r>
+            <a:r>
+              <a:rPr lang="en-US" sz="1800" dirty="0">
+                <a:solidFill>
+                  <a:schemeClr val="tx1"/>
+                </a:solidFill>
+                <a:latin typeface="Courier New" panose="02070309020205020404" pitchFamily="49" charset="0"/>
+                <a:cs typeface="Courier New" panose="02070309020205020404" pitchFamily="49" charset="0"/>
+              </a:rPr>
+              <a:t>HEAD</a:t>
+            </a:r>
+            <a:endParaRPr lang="en-US" dirty="0">
+              <a:solidFill>
+                <a:schemeClr val="tx1"/>
+              </a:solidFill>
+              <a:latin typeface="Courier New" panose="02070309020205020404" pitchFamily="49" charset="0"/>
+              <a:cs typeface="Courier New" panose="02070309020205020404" pitchFamily="49" charset="0"/>
+            </a:endParaRPr>
+          </a:p>
+          <a:p>
+            <a:pPr marL="801688" indent="0">
+              <a:buNone/>
+            </a:pPr>
+            <a:r>
+              <a:rPr lang="en-US" sz="1600" dirty="0">
+                <a:latin typeface="Courier New" panose="02070309020205020404" pitchFamily="49" charset="0"/>
+                <a:cs typeface="Courier New" panose="02070309020205020404" pitchFamily="49" charset="0"/>
+              </a:rPr>
+              <a:t>$ git branch branch_name</a:t>
+            </a:r>
+          </a:p>
+          <a:p>
+            <a:pPr lvl="1"/>
+            <a:r>
+              <a:rPr lang="en-US" dirty="0"/>
+              <a:t>List local branches</a:t>
+            </a:r>
+          </a:p>
+          <a:p>
+            <a:pPr marL="801688" indent="0">
+              <a:buNone/>
+            </a:pPr>
+            <a:r>
+              <a:rPr lang="en-US" sz="1600" dirty="0">
+                <a:latin typeface="Courier New" panose="02070309020205020404" pitchFamily="49" charset="0"/>
+                <a:cs typeface="Courier New" panose="02070309020205020404" pitchFamily="49" charset="0"/>
+              </a:rPr>
+              <a:t>$ git branch</a:t>
+            </a:r>
+          </a:p>
+          <a:p>
+            <a:pPr lvl="1"/>
+            <a:r>
+              <a:rPr lang="en-US" dirty="0"/>
+              <a:t>Delete branch named 'branch_name'</a:t>
+            </a:r>
+          </a:p>
+          <a:p>
+            <a:pPr marL="801688" indent="0">
+              <a:buNone/>
+            </a:pPr>
+            <a:r>
+              <a:rPr lang="en-US" sz="1600" dirty="0">
+                <a:latin typeface="Courier New" panose="02070309020205020404" pitchFamily="49" charset="0"/>
+                <a:cs typeface="Courier New" panose="02070309020205020404" pitchFamily="49" charset="0"/>
+              </a:rPr>
+              <a:t>$ git branch -d branch_name</a:t>
+            </a:r>
+          </a:p>
+          <a:p>
+            <a:pPr lvl="1"/>
+            <a:r>
+              <a:rPr lang="en-US" dirty="0"/>
+              <a:t>Rename the branch  </a:t>
+            </a:r>
+            <a:r>
+              <a:rPr lang="en-US" dirty="0">
+                <a:solidFill>
+                  <a:schemeClr val="tx1"/>
+                </a:solidFill>
+                <a:latin typeface="Courier New" panose="02070309020205020404" pitchFamily="49" charset="0"/>
+                <a:cs typeface="Courier New" panose="02070309020205020404" pitchFamily="49" charset="0"/>
+              </a:rPr>
+              <a:t>branch_name</a:t>
+            </a:r>
+            <a:r>
+              <a:rPr lang="en-US" dirty="0"/>
+              <a:t>  to new name:  </a:t>
+            </a:r>
+            <a:r>
+              <a:rPr lang="en-US" dirty="0">
+                <a:solidFill>
+                  <a:schemeClr val="tx1"/>
+                </a:solidFill>
+                <a:latin typeface="Courier New" panose="02070309020205020404" pitchFamily="49" charset="0"/>
+                <a:cs typeface="Courier New" panose="02070309020205020404" pitchFamily="49" charset="0"/>
+              </a:rPr>
+              <a:t>new_branch_name</a:t>
+            </a:r>
+          </a:p>
+          <a:p>
+            <a:pPr marL="801688" indent="0">
+              <a:buNone/>
+            </a:pPr>
+            <a:r>
+              <a:rPr lang="en-US" sz="1600" dirty="0">
+                <a:latin typeface="Courier New" panose="02070309020205020404" pitchFamily="49" charset="0"/>
+                <a:cs typeface="Courier New" panose="02070309020205020404" pitchFamily="49" charset="0"/>
+              </a:rPr>
+              <a:t>$ git branch -m branch_name new_branch_name</a:t>
+            </a:r>
+          </a:p>
+        </p:txBody>
+      </p:sp>
+      <p:sp>
+        <p:nvSpPr>
+          <p:cNvPr id="4" name="TextBox 3">
             <a:extLst>
               <a:ext uri="{FF2B5EF4-FFF2-40B4-BE49-F238E27FC236}">
-                <a16:creationId xmlns:a16="http://schemas.microsoft.com/office/drawing/2014/main" id="{683A3D10-4CC3-48CB-905D-DF3F31119B55}"/>
-              </a:ext>
-            </a:extLst>
-          </p:cNvPr>
-          <p:cNvPicPr>
-            <a:picLocks noChangeAspect="1"/>
-          </p:cNvPicPr>
-          <p:nvPr/>
-        </p:nvPicPr>
-        <p:blipFill rotWithShape="1">
-          <a:blip r:embed="rId3"/>
-          <a:srcRect b="13104"/>
-          <a:stretch/>
-        </p:blipFill>
-        <p:spPr>
-          <a:xfrm>
-            <a:off x="223601" y="16728"/>
-            <a:ext cx="7753450" cy="5610072"/>
-          </a:xfrm>
-          <a:prstGeom prst="rect">
-            <a:avLst/>
-          </a:prstGeom>
-        </p:spPr>
-      </p:pic>
-      <p:sp>
-        <p:nvSpPr>
-          <p:cNvPr id="3" name="TextBox 2">
-            <a:extLst>
-              <a:ext uri="{FF2B5EF4-FFF2-40B4-BE49-F238E27FC236}">
-                <a16:creationId xmlns:a16="http://schemas.microsoft.com/office/drawing/2014/main" id="{F79BAF6B-CF2F-4C8F-9A35-532D9626EBA2}"/>
+                <a16:creationId xmlns:a16="http://schemas.microsoft.com/office/drawing/2014/main" id="{B601D247-3D75-4D67-842C-20FDCCCA9524}"/>
               </a:ext>
             </a:extLst>
           </p:cNvPr>
@@ -4202,13 +4909,18 @@
         </p:nvSpPr>
         <p:spPr>
           <a:xfrm>
-            <a:off x="1475935" y="5872161"/>
-            <a:ext cx="7668065" cy="338554"/>
+            <a:off x="4380410" y="6007432"/>
+            <a:ext cx="4336869" cy="307777"/>
           </a:xfrm>
           <a:prstGeom prst="rect">
             <a:avLst/>
           </a:prstGeom>
           <a:noFill/>
+          <a:ln>
+            <a:solidFill>
+              <a:schemeClr val="tx1"/>
+            </a:solidFill>
+          </a:ln>
         </p:spPr>
         <p:txBody>
           <a:bodyPr wrap="square" rtlCol="0">
@@ -4222,22 +4934,22 @@
               </a:spcBef>
             </a:pPr>
             <a:r>
-              <a:rPr lang="en-US" sz="1600" dirty="0">
+              <a:rPr lang="en-US" sz="1400" dirty="0">
                 <a:latin typeface="Times New Roman" panose="02020603050405020304" pitchFamily="18" charset="0"/>
                 <a:cs typeface="Times New Roman" panose="02020603050405020304" pitchFamily="18" charset="0"/>
               </a:rPr>
-              <a:t>Go to GitHub docs for interactive explanation, </a:t>
-            </a:r>
-            <a:r>
-              <a:rPr lang="en-US" sz="1600" dirty="0">
+              <a:t>Docs for ‘git branch’, </a:t>
+            </a:r>
+            <a:r>
+              <a:rPr lang="en-US" sz="1400" dirty="0">
                 <a:latin typeface="Times New Roman" panose="02020603050405020304" pitchFamily="18" charset="0"/>
                 <a:cs typeface="Times New Roman" panose="02020603050405020304" pitchFamily="18" charset="0"/>
-                <a:hlinkClick r:id="rId4"/>
-              </a:rPr>
-              <a:t>https://guides.github.com/introduction/flow</a:t>
-            </a:r>
-            <a:r>
-              <a:rPr lang="en-US" sz="1600" dirty="0">
+                <a:hlinkClick r:id="rId3"/>
+              </a:rPr>
+              <a:t>https://git-scm.com/docs/git-branch</a:t>
+            </a:r>
+            <a:r>
+              <a:rPr lang="en-US" sz="1400" dirty="0">
                 <a:latin typeface="Times New Roman" panose="02020603050405020304" pitchFamily="18" charset="0"/>
                 <a:cs typeface="Times New Roman" panose="02020603050405020304" pitchFamily="18" charset="0"/>
               </a:rPr>
@@ -4249,7 +4961,7 @@
     </p:spTree>
     <p:extLst>
       <p:ext uri="{BB962C8B-B14F-4D97-AF65-F5344CB8AC3E}">
-        <p14:creationId xmlns:p14="http://schemas.microsoft.com/office/powerpoint/2010/main" val="2040364059"/>
+        <p14:creationId xmlns:p14="http://schemas.microsoft.com/office/powerpoint/2010/main" val="650932450"/>
       </p:ext>
     </p:extLst>
   </p:cSld>
@@ -4300,20 +5012,15 @@
           <a:p>
             <a:r>
               <a:rPr lang="en-US" dirty="0"/>
-              <a:t>Class discussion:</a:t>
-            </a:r>
-          </a:p>
-        </p:txBody>
-      </p:sp>
-      <p:sp>
-        <p:nvSpPr>
-          <p:cNvPr id="6" name="Content Placeholder 2">
-            <a:extLst>
-              <a:ext uri="{FF2B5EF4-FFF2-40B4-BE49-F238E27FC236}">
-                <a16:creationId xmlns:a16="http://schemas.microsoft.com/office/drawing/2014/main" id="{9081FF26-7AD5-4767-AF65-A27F1769E1FC}"/>
-              </a:ext>
-            </a:extLst>
-          </p:cNvPr>
+              <a:t>git workflow – create, then merge a branch</a:t>
+            </a:r>
+            <a:endParaRPr lang="en-US" b="0" dirty="0"/>
+          </a:p>
+        </p:txBody>
+      </p:sp>
+      <p:sp>
+        <p:nvSpPr>
+          <p:cNvPr id="3" name="Content Placeholder 2"/>
           <p:cNvSpPr>
             <a:spLocks noGrp="1"/>
           </p:cNvSpPr>
@@ -4323,8 +5030,8 @@
         </p:nvSpPr>
         <p:spPr>
           <a:xfrm>
-            <a:off x="152400" y="827314"/>
-            <a:ext cx="8839200" cy="5146766"/>
+            <a:off x="276639" y="827314"/>
+            <a:ext cx="8608944" cy="5406337"/>
           </a:xfrm>
         </p:spPr>
         <p:txBody>
@@ -4334,17 +5041,303 @@
           <a:lstStyle/>
           <a:p>
             <a:r>
-              <a:rPr lang="en-US" sz="1800" i="0" dirty="0"/>
-              <a:t>TBD…</a:t>
-            </a:r>
-            <a:endParaRPr lang="en-US" i="0" dirty="0"/>
+              <a:rPr lang="en-US" dirty="0"/>
+              <a:t>Create a new branch, named ‘issue03’</a:t>
+            </a:r>
+          </a:p>
+          <a:p>
+            <a:pPr lvl="1"/>
+            <a:r>
+              <a:rPr lang="en-US" dirty="0"/>
+              <a:t>perhaps the goal is to address issue #3 from GitHub repo</a:t>
+            </a:r>
+          </a:p>
+          <a:p>
+            <a:pPr marL="461963" indent="0">
+              <a:buNone/>
+            </a:pPr>
+            <a:r>
+              <a:rPr lang="en-US" sz="1600" dirty="0">
+                <a:latin typeface="Courier New" panose="02070309020205020404" pitchFamily="49" charset="0"/>
+                <a:cs typeface="Courier New" panose="02070309020205020404" pitchFamily="49" charset="0"/>
+              </a:rPr>
+              <a:t>$ git checkout –b issue03</a:t>
+            </a:r>
+          </a:p>
+          <a:p>
+            <a:pPr lvl="1"/>
+            <a:r>
+              <a:rPr lang="en-US" dirty="0"/>
+              <a:t>the above is shorthand for the following two commands:</a:t>
+            </a:r>
+          </a:p>
+          <a:p>
+            <a:pPr marL="461963" indent="0">
+              <a:buNone/>
+            </a:pPr>
+            <a:r>
+              <a:rPr lang="en-US" sz="1600" dirty="0">
+                <a:latin typeface="Courier New" panose="02070309020205020404" pitchFamily="49" charset="0"/>
+                <a:cs typeface="Courier New" panose="02070309020205020404" pitchFamily="49" charset="0"/>
+              </a:rPr>
+              <a:t>$ git branch issue03</a:t>
+            </a:r>
+          </a:p>
+          <a:p>
+            <a:pPr marL="461963" indent="0">
+              <a:buNone/>
+            </a:pPr>
+            <a:r>
+              <a:rPr lang="en-US" sz="1600" dirty="0">
+                <a:latin typeface="Courier New" panose="02070309020205020404" pitchFamily="49" charset="0"/>
+                <a:cs typeface="Courier New" panose="02070309020205020404" pitchFamily="49" charset="0"/>
+              </a:rPr>
+              <a:t>$ git checkout issue03</a:t>
+            </a:r>
+          </a:p>
+          <a:p>
+            <a:pPr marL="461963" indent="0">
+              <a:buNone/>
+            </a:pPr>
+            <a:endParaRPr lang="en-US" sz="1600" dirty="0">
+              <a:latin typeface="Courier New" panose="02070309020205020404" pitchFamily="49" charset="0"/>
+              <a:cs typeface="Courier New" panose="02070309020205020404" pitchFamily="49" charset="0"/>
+            </a:endParaRPr>
+          </a:p>
+          <a:p>
+            <a:r>
+              <a:rPr lang="en-US" dirty="0"/>
+              <a:t>Add a new file to the branch (trivial example)</a:t>
+            </a:r>
+          </a:p>
+          <a:p>
+            <a:pPr marL="461963" indent="0">
+              <a:buNone/>
+            </a:pPr>
+            <a:r>
+              <a:rPr lang="en-US" sz="1600" dirty="0">
+                <a:latin typeface="Courier New" panose="02070309020205020404" pitchFamily="49" charset="0"/>
+                <a:cs typeface="Courier New" panose="02070309020205020404" pitchFamily="49" charset="0"/>
+              </a:rPr>
+              <a:t>$ touch dummy.txt</a:t>
+            </a:r>
+          </a:p>
+          <a:p>
+            <a:pPr marL="461963" indent="0">
+              <a:buNone/>
+            </a:pPr>
+            <a:r>
+              <a:rPr lang="en-US" sz="1600" dirty="0">
+                <a:latin typeface="Courier New" panose="02070309020205020404" pitchFamily="49" charset="0"/>
+                <a:cs typeface="Courier New" panose="02070309020205020404" pitchFamily="49" charset="0"/>
+              </a:rPr>
+              <a:t>$ git add dummy.txt</a:t>
+            </a:r>
+          </a:p>
+          <a:p>
+            <a:pPr marL="461963" indent="0">
+              <a:buNone/>
+            </a:pPr>
+            <a:r>
+              <a:rPr lang="en-US" sz="1600" dirty="0">
+                <a:latin typeface="Courier New" panose="02070309020205020404" pitchFamily="49" charset="0"/>
+                <a:cs typeface="Courier New" panose="02070309020205020404" pitchFamily="49" charset="0"/>
+              </a:rPr>
+              <a:t>$ git commit –m ‘this file is empty’</a:t>
+            </a:r>
+          </a:p>
+          <a:p>
+            <a:pPr marL="461963" indent="0">
+              <a:buNone/>
+            </a:pPr>
+            <a:r>
+              <a:rPr lang="en-US" sz="1600" dirty="0">
+                <a:latin typeface="Courier New" panose="02070309020205020404" pitchFamily="49" charset="0"/>
+                <a:cs typeface="Courier New" panose="02070309020205020404" pitchFamily="49" charset="0"/>
+              </a:rPr>
+              <a:t>$ git push</a:t>
+            </a:r>
+          </a:p>
+          <a:p>
+            <a:pPr marL="461963" indent="0">
+              <a:buNone/>
+            </a:pPr>
+            <a:endParaRPr lang="en-US" sz="1600" dirty="0">
+              <a:latin typeface="Courier New" panose="02070309020205020404" pitchFamily="49" charset="0"/>
+              <a:cs typeface="Courier New" panose="02070309020205020404" pitchFamily="49" charset="0"/>
+            </a:endParaRPr>
+          </a:p>
+          <a:p>
+            <a:r>
+              <a:rPr lang="en-US" dirty="0"/>
+              <a:t>Merge this branch into the ‘master’ branch</a:t>
+            </a:r>
+          </a:p>
+          <a:p>
+            <a:pPr marL="461963" indent="0">
+              <a:buNone/>
+            </a:pPr>
+            <a:r>
+              <a:rPr lang="en-US" sz="1600" dirty="0">
+                <a:latin typeface="Courier New" panose="02070309020205020404" pitchFamily="49" charset="0"/>
+                <a:cs typeface="Courier New" panose="02070309020205020404" pitchFamily="49" charset="0"/>
+              </a:rPr>
+              <a:t>$ git checkout master</a:t>
+            </a:r>
+          </a:p>
+          <a:p>
+            <a:pPr marL="461963" indent="0">
+              <a:buNone/>
+            </a:pPr>
+            <a:r>
+              <a:rPr lang="en-US" sz="1600" dirty="0">
+                <a:latin typeface="Courier New" panose="02070309020205020404" pitchFamily="49" charset="0"/>
+                <a:cs typeface="Courier New" panose="02070309020205020404" pitchFamily="49" charset="0"/>
+              </a:rPr>
+              <a:t>$ git merge issue03</a:t>
+            </a:r>
+          </a:p>
+          <a:p>
+            <a:pPr marL="801688" indent="0">
+              <a:buNone/>
+            </a:pPr>
+            <a:endParaRPr lang="en-US" sz="1600" dirty="0">
+              <a:latin typeface="Courier New" panose="02070309020205020404" pitchFamily="49" charset="0"/>
+              <a:cs typeface="Courier New" panose="02070309020205020404" pitchFamily="49" charset="0"/>
+            </a:endParaRPr>
+          </a:p>
+        </p:txBody>
+      </p:sp>
+      <p:sp>
+        <p:nvSpPr>
+          <p:cNvPr id="4" name="TextBox 3">
+            <a:extLst>
+              <a:ext uri="{FF2B5EF4-FFF2-40B4-BE49-F238E27FC236}">
+                <a16:creationId xmlns:a16="http://schemas.microsoft.com/office/drawing/2014/main" id="{B601D247-3D75-4D67-842C-20FDCCCA9524}"/>
+              </a:ext>
+            </a:extLst>
+          </p:cNvPr>
+          <p:cNvSpPr txBox="1"/>
+          <p:nvPr/>
+        </p:nvSpPr>
+        <p:spPr>
+          <a:xfrm>
+            <a:off x="4659084" y="5401699"/>
+            <a:ext cx="4336869" cy="307777"/>
+          </a:xfrm>
+          <a:prstGeom prst="rect">
+            <a:avLst/>
+          </a:prstGeom>
+          <a:noFill/>
+          <a:ln>
+            <a:solidFill>
+              <a:schemeClr val="tx1"/>
+            </a:solidFill>
+          </a:ln>
+        </p:spPr>
+        <p:txBody>
+          <a:bodyPr wrap="square" rtlCol="0">
+            <a:spAutoFit/>
+          </a:bodyPr>
+          <a:lstStyle/>
+          <a:p>
+            <a:pPr marL="227013" indent="-227013">
+              <a:spcBef>
+                <a:spcPts val="300"/>
+              </a:spcBef>
+            </a:pPr>
+            <a:r>
+              <a:rPr lang="en-US" sz="1400" dirty="0">
+                <a:latin typeface="Times New Roman" panose="02020603050405020304" pitchFamily="18" charset="0"/>
+                <a:cs typeface="Times New Roman" panose="02020603050405020304" pitchFamily="18" charset="0"/>
+              </a:rPr>
+              <a:t>Docs for ‘git merge’, </a:t>
+            </a:r>
+            <a:r>
+              <a:rPr lang="en-US" sz="1400" dirty="0">
+                <a:latin typeface="Times New Roman" panose="02020603050405020304" pitchFamily="18" charset="0"/>
+                <a:cs typeface="Times New Roman" panose="02020603050405020304" pitchFamily="18" charset="0"/>
+                <a:hlinkClick r:id="rId3"/>
+              </a:rPr>
+              <a:t>https://git-scm.com/docs/git-merge</a:t>
+            </a:r>
+            <a:r>
+              <a:rPr lang="en-US" sz="1400" dirty="0">
+                <a:latin typeface="Times New Roman" panose="02020603050405020304" pitchFamily="18" charset="0"/>
+                <a:cs typeface="Times New Roman" panose="02020603050405020304" pitchFamily="18" charset="0"/>
+              </a:rPr>
+              <a:t> </a:t>
+            </a:r>
+          </a:p>
+        </p:txBody>
+      </p:sp>
+      <p:sp>
+        <p:nvSpPr>
+          <p:cNvPr id="5" name="TextBox 4">
+            <a:extLst>
+              <a:ext uri="{FF2B5EF4-FFF2-40B4-BE49-F238E27FC236}">
+                <a16:creationId xmlns:a16="http://schemas.microsoft.com/office/drawing/2014/main" id="{053F9438-D265-4653-9228-55B626B46C7A}"/>
+              </a:ext>
+            </a:extLst>
+          </p:cNvPr>
+          <p:cNvSpPr txBox="1"/>
+          <p:nvPr/>
+        </p:nvSpPr>
+        <p:spPr>
+          <a:xfrm>
+            <a:off x="1184366" y="5807033"/>
+            <a:ext cx="7811587" cy="307777"/>
+          </a:xfrm>
+          <a:prstGeom prst="rect">
+            <a:avLst/>
+          </a:prstGeom>
+          <a:noFill/>
+          <a:ln>
+            <a:solidFill>
+              <a:schemeClr val="tx1"/>
+            </a:solidFill>
+          </a:ln>
+        </p:spPr>
+        <p:txBody>
+          <a:bodyPr wrap="square" rtlCol="0">
+            <a:spAutoFit/>
+          </a:bodyPr>
+          <a:lstStyle/>
+          <a:p>
+            <a:pPr marL="227013" indent="-227013">
+              <a:spcBef>
+                <a:spcPts val="300"/>
+              </a:spcBef>
+            </a:pPr>
+            <a:r>
+              <a:rPr lang="en-US" sz="1400" dirty="0">
+                <a:latin typeface="Times New Roman" panose="02020603050405020304" pitchFamily="18" charset="0"/>
+                <a:cs typeface="Times New Roman" panose="02020603050405020304" pitchFamily="18" charset="0"/>
+              </a:rPr>
+              <a:t>More workflow details here, </a:t>
+            </a:r>
+            <a:r>
+              <a:rPr lang="en-US" sz="1400" dirty="0">
+                <a:latin typeface="Times New Roman" panose="02020603050405020304" pitchFamily="18" charset="0"/>
+                <a:cs typeface="Times New Roman" panose="02020603050405020304" pitchFamily="18" charset="0"/>
+                <a:hlinkClick r:id="rId4"/>
+              </a:rPr>
+              <a:t>https://git-scm.com/book/en/v2/Git-Branching-Basic-Branching-and-Merging</a:t>
+            </a:r>
+            <a:r>
+              <a:rPr lang="en-US" sz="1400" dirty="0">
+                <a:latin typeface="Times New Roman" panose="02020603050405020304" pitchFamily="18" charset="0"/>
+                <a:cs typeface="Times New Roman" panose="02020603050405020304" pitchFamily="18" charset="0"/>
+              </a:rPr>
+              <a:t> </a:t>
+            </a:r>
           </a:p>
         </p:txBody>
       </p:sp>
     </p:spTree>
     <p:extLst>
       <p:ext uri="{BB962C8B-B14F-4D97-AF65-F5344CB8AC3E}">
-        <p14:creationId xmlns:p14="http://schemas.microsoft.com/office/powerpoint/2010/main" val="2046148354"/>
+        <p14:creationId xmlns:p14="http://schemas.microsoft.com/office/powerpoint/2010/main" val="3989700263"/>
       </p:ext>
     </p:extLst>
   </p:cSld>
@@ -4383,6 +5376,1111 @@
         </p:nvSpPr>
         <p:spPr>
           <a:xfrm>
+            <a:off x="0" y="140672"/>
+            <a:ext cx="9144000" cy="589085"/>
+          </a:xfrm>
+        </p:spPr>
+        <p:txBody>
+          <a:bodyPr>
+            <a:normAutofit/>
+          </a:bodyPr>
+          <a:lstStyle/>
+          <a:p>
+            <a:r>
+              <a:rPr lang="en-US" dirty="0"/>
+              <a:t>Class discussion:</a:t>
+            </a:r>
+          </a:p>
+        </p:txBody>
+      </p:sp>
+      <p:sp>
+        <p:nvSpPr>
+          <p:cNvPr id="6" name="Content Placeholder 2">
+            <a:extLst>
+              <a:ext uri="{FF2B5EF4-FFF2-40B4-BE49-F238E27FC236}">
+                <a16:creationId xmlns:a16="http://schemas.microsoft.com/office/drawing/2014/main" id="{9081FF26-7AD5-4767-AF65-A27F1769E1FC}"/>
+              </a:ext>
+            </a:extLst>
+          </p:cNvPr>
+          <p:cNvSpPr>
+            <a:spLocks noGrp="1"/>
+          </p:cNvSpPr>
+          <p:nvPr>
+            <p:ph idx="1"/>
+          </p:nvPr>
+        </p:nvSpPr>
+        <p:spPr>
+          <a:xfrm>
+            <a:off x="152400" y="827314"/>
+            <a:ext cx="8839200" cy="5364480"/>
+          </a:xfrm>
+        </p:spPr>
+        <p:txBody>
+          <a:bodyPr>
+            <a:normAutofit/>
+          </a:bodyPr>
+          <a:lstStyle/>
+          <a:p>
+            <a:r>
+              <a:rPr lang="en-US" sz="1800" i="0" dirty="0"/>
+              <a:t>Any questions at this point?</a:t>
+            </a:r>
+          </a:p>
+          <a:p>
+            <a:pPr lvl="1"/>
+            <a:endParaRPr lang="en-US" i="0" dirty="0"/>
+          </a:p>
+          <a:p>
+            <a:r>
+              <a:rPr lang="en-US" i="0" dirty="0"/>
+              <a:t>Why would you want to create a branch?</a:t>
+            </a:r>
+          </a:p>
+          <a:p>
+            <a:endParaRPr lang="en-US" dirty="0"/>
+          </a:p>
+          <a:p>
+            <a:r>
+              <a:rPr lang="en-US" i="0" dirty="0"/>
+              <a:t>What is a ‘ref’ </a:t>
+            </a:r>
+            <a:r>
+              <a:rPr lang="en-US" dirty="0"/>
+              <a:t>in the world of git?</a:t>
+            </a:r>
+            <a:endParaRPr lang="en-US" i="0" dirty="0"/>
+          </a:p>
+          <a:p>
+            <a:pPr lvl="1"/>
+            <a:endParaRPr lang="en-US" dirty="0"/>
+          </a:p>
+          <a:p>
+            <a:pPr lvl="1"/>
+            <a:endParaRPr lang="en-US" dirty="0"/>
+          </a:p>
+          <a:p>
+            <a:pPr lvl="1"/>
+            <a:endParaRPr lang="en-US" dirty="0"/>
+          </a:p>
+          <a:p>
+            <a:pPr lvl="1"/>
+            <a:endParaRPr lang="en-US" dirty="0"/>
+          </a:p>
+          <a:p>
+            <a:r>
+              <a:rPr lang="en-US" i="0" dirty="0"/>
+              <a:t>Today’s computer lab exercises will provide some practical experience</a:t>
+            </a:r>
+          </a:p>
+        </p:txBody>
+      </p:sp>
+    </p:spTree>
+    <p:extLst>
+      <p:ext uri="{BB962C8B-B14F-4D97-AF65-F5344CB8AC3E}">
+        <p14:creationId xmlns:p14="http://schemas.microsoft.com/office/powerpoint/2010/main" val="89718216"/>
+      </p:ext>
+    </p:extLst>
+  </p:cSld>
+  <p:clrMapOvr>
+    <a:masterClrMapping/>
+  </p:clrMapOvr>
+</p:sld>
+</file>
+
+<file path=ppt/slides/slide14.xml><?xml version="1.0" encoding="utf-8"?>
+<p:sld xmlns:a="http://schemas.openxmlformats.org/drawingml/2006/main" xmlns:r="http://schemas.openxmlformats.org/officeDocument/2006/relationships" xmlns:p="http://schemas.openxmlformats.org/presentationml/2006/main">
+  <p:cSld>
+    <p:spTree>
+      <p:nvGrpSpPr>
+        <p:cNvPr id="1" name=""/>
+        <p:cNvGrpSpPr/>
+        <p:nvPr/>
+      </p:nvGrpSpPr>
+      <p:grpSpPr>
+        <a:xfrm>
+          <a:off x="0" y="0"/>
+          <a:ext cx="0" cy="0"/>
+          <a:chOff x="0" y="0"/>
+          <a:chExt cx="0" cy="0"/>
+        </a:xfrm>
+      </p:grpSpPr>
+      <p:sp>
+        <p:nvSpPr>
+          <p:cNvPr id="2" name="Title 1"/>
+          <p:cNvSpPr>
+            <a:spLocks noGrp="1"/>
+          </p:cNvSpPr>
+          <p:nvPr>
+            <p:ph type="title"/>
+          </p:nvPr>
+        </p:nvSpPr>
+        <p:spPr>
+          <a:xfrm>
+            <a:off x="9111" y="0"/>
+            <a:ext cx="9144000" cy="589085"/>
+          </a:xfrm>
+        </p:spPr>
+        <p:txBody>
+          <a:bodyPr>
+            <a:normAutofit/>
+          </a:bodyPr>
+          <a:lstStyle/>
+          <a:p>
+            <a:r>
+              <a:rPr lang="en-US" dirty="0"/>
+              <a:t>GitHub overview</a:t>
+            </a:r>
+            <a:endParaRPr lang="en-US" b="0" dirty="0"/>
+          </a:p>
+        </p:txBody>
+      </p:sp>
+      <p:sp>
+        <p:nvSpPr>
+          <p:cNvPr id="3" name="Content Placeholder 2"/>
+          <p:cNvSpPr>
+            <a:spLocks noGrp="1"/>
+          </p:cNvSpPr>
+          <p:nvPr>
+            <p:ph idx="1"/>
+          </p:nvPr>
+        </p:nvSpPr>
+        <p:spPr>
+          <a:xfrm>
+            <a:off x="276639" y="653144"/>
+            <a:ext cx="8608944" cy="5580508"/>
+          </a:xfrm>
+        </p:spPr>
+        <p:txBody>
+          <a:bodyPr>
+            <a:normAutofit/>
+          </a:bodyPr>
+          <a:lstStyle/>
+          <a:p>
+            <a:r>
+              <a:rPr lang="en-US" dirty="0"/>
+              <a:t>GitHub &amp; Bitbucket are two of the largest web-based hosting services</a:t>
+            </a:r>
+          </a:p>
+          <a:p>
+            <a:pPr lvl="1"/>
+            <a:endParaRPr lang="en-US" dirty="0"/>
+          </a:p>
+          <a:p>
+            <a:pPr lvl="1"/>
+            <a:r>
+              <a:rPr lang="en-US" dirty="0"/>
+              <a:t>they are targeted towards software development projects</a:t>
+            </a:r>
+          </a:p>
+          <a:p>
+            <a:pPr lvl="2"/>
+            <a:r>
+              <a:rPr lang="en-US" dirty="0"/>
+              <a:t>can be used for proposals, papers or any collection of documents</a:t>
+            </a:r>
+          </a:p>
+          <a:p>
+            <a:pPr lvl="1"/>
+            <a:r>
+              <a:rPr lang="en-US" dirty="0"/>
+              <a:t>neither supports Subversion (SVN)</a:t>
+            </a:r>
+          </a:p>
+          <a:p>
+            <a:pPr lvl="2"/>
+            <a:r>
+              <a:rPr lang="en-US" dirty="0"/>
+              <a:t>GitHub exclusively supports </a:t>
+            </a:r>
+            <a:r>
+              <a:rPr lang="en-US" b="0" dirty="0">
+                <a:solidFill>
+                  <a:schemeClr val="tx1"/>
+                </a:solidFill>
+                <a:latin typeface="Courier New" panose="02070309020205020404" pitchFamily="49" charset="0"/>
+                <a:cs typeface="Courier New" panose="02070309020205020404" pitchFamily="49" charset="0"/>
+              </a:rPr>
+              <a:t>git</a:t>
+            </a:r>
+            <a:r>
+              <a:rPr lang="en-US" dirty="0"/>
+              <a:t>;  Bitbucket supports </a:t>
+            </a:r>
+            <a:r>
+              <a:rPr lang="en-US" sz="1600" b="0" dirty="0">
+                <a:solidFill>
+                  <a:schemeClr val="tx1"/>
+                </a:solidFill>
+                <a:latin typeface="Courier New" panose="02070309020205020404" pitchFamily="49" charset="0"/>
+                <a:cs typeface="Courier New" panose="02070309020205020404" pitchFamily="49" charset="0"/>
+              </a:rPr>
+              <a:t>git</a:t>
+            </a:r>
+            <a:r>
+              <a:rPr lang="en-US" dirty="0"/>
+              <a:t> and </a:t>
+            </a:r>
+            <a:r>
+              <a:rPr lang="en-US" sz="1600" b="0" dirty="0">
+                <a:solidFill>
+                  <a:schemeClr val="tx1"/>
+                </a:solidFill>
+                <a:latin typeface="Courier New" panose="02070309020205020404" pitchFamily="49" charset="0"/>
+                <a:cs typeface="Courier New" panose="02070309020205020404" pitchFamily="49" charset="0"/>
+              </a:rPr>
+              <a:t>mercurial</a:t>
+            </a:r>
+            <a:endParaRPr lang="en-US" b="0" dirty="0">
+              <a:solidFill>
+                <a:schemeClr val="tx1"/>
+              </a:solidFill>
+              <a:latin typeface="Courier New" panose="02070309020205020404" pitchFamily="49" charset="0"/>
+              <a:cs typeface="Courier New" panose="02070309020205020404" pitchFamily="49" charset="0"/>
+            </a:endParaRPr>
+          </a:p>
+          <a:p>
+            <a:r>
+              <a:rPr lang="en-US" dirty="0"/>
+              <a:t>GitHub provides the following features (and more):</a:t>
+            </a:r>
+          </a:p>
+          <a:p>
+            <a:pPr lvl="1"/>
+            <a:r>
+              <a:rPr lang="en-US" dirty="0"/>
+              <a:t>an integrated issue tracker</a:t>
+            </a:r>
+          </a:p>
+          <a:p>
+            <a:pPr lvl="1"/>
+            <a:r>
+              <a:rPr lang="en-US" dirty="0"/>
+              <a:t>branch comparison views</a:t>
+            </a:r>
+          </a:p>
+          <a:p>
+            <a:pPr lvl="1"/>
+            <a:r>
+              <a:rPr lang="en-US" dirty="0"/>
+              <a:t>native applications for Windows and Mac desktops</a:t>
+            </a:r>
+          </a:p>
+          <a:p>
+            <a:pPr lvl="2"/>
+            <a:r>
+              <a:rPr lang="en-US" dirty="0"/>
+              <a:t>https://desktop.github.com/</a:t>
+            </a:r>
+          </a:p>
+          <a:p>
+            <a:pPr lvl="1"/>
+            <a:r>
+              <a:rPr lang="en-US" dirty="0"/>
+              <a:t>support for over 200 programming languages and data formats</a:t>
+            </a:r>
+          </a:p>
+          <a:p>
+            <a:pPr lvl="1"/>
+            <a:r>
+              <a:rPr lang="en-US" dirty="0"/>
+              <a:t>GitHub pages, a feature for publishing and hosting</a:t>
+            </a:r>
+          </a:p>
+          <a:p>
+            <a:pPr lvl="1"/>
+            <a:r>
+              <a:rPr lang="en-US" dirty="0"/>
+              <a:t>SSL, SSH &amp; https for data transmission;  two-factor authentication for login</a:t>
+            </a:r>
+          </a:p>
+          <a:p>
+            <a:pPr lvl="1"/>
+            <a:r>
+              <a:rPr lang="en-US" dirty="0"/>
+              <a:t>API integration for 3</a:t>
+            </a:r>
+            <a:r>
+              <a:rPr lang="en-US" baseline="30000" dirty="0"/>
+              <a:t>rd</a:t>
+            </a:r>
+            <a:r>
+              <a:rPr lang="en-US" dirty="0"/>
+              <a:t>-party tool and other platforms</a:t>
+            </a:r>
+          </a:p>
+          <a:p>
+            <a:pPr lvl="1"/>
+            <a:r>
+              <a:rPr lang="en-US" dirty="0"/>
+              <a:t>partial support is provided for </a:t>
+            </a:r>
+            <a:r>
+              <a:rPr lang="en-US" sz="1800" dirty="0">
+                <a:solidFill>
+                  <a:schemeClr val="tx1"/>
+                </a:solidFill>
+                <a:latin typeface="Courier New" panose="02070309020205020404" pitchFamily="49" charset="0"/>
+                <a:cs typeface="Courier New" panose="02070309020205020404" pitchFamily="49" charset="0"/>
+              </a:rPr>
+              <a:t>SVN</a:t>
+            </a:r>
+            <a:endParaRPr lang="en-US" dirty="0">
+              <a:solidFill>
+                <a:schemeClr val="tx1"/>
+              </a:solidFill>
+              <a:latin typeface="Courier New" panose="02070309020205020404" pitchFamily="49" charset="0"/>
+              <a:cs typeface="Courier New" panose="02070309020205020404" pitchFamily="49" charset="0"/>
+            </a:endParaRPr>
+          </a:p>
+          <a:p>
+            <a:pPr lvl="2"/>
+            <a:r>
+              <a:rPr lang="en-US" dirty="0"/>
+              <a:t>import SVN repos into git</a:t>
+            </a:r>
+          </a:p>
+          <a:p>
+            <a:pPr lvl="2"/>
+            <a:r>
+              <a:rPr lang="en-US" dirty="0"/>
+              <a:t>GitHub repos can be cloned directly via the SVN client.</a:t>
+            </a:r>
+          </a:p>
+        </p:txBody>
+      </p:sp>
+      <p:sp>
+        <p:nvSpPr>
+          <p:cNvPr id="4" name="TextBox 3">
+            <a:extLst>
+              <a:ext uri="{FF2B5EF4-FFF2-40B4-BE49-F238E27FC236}">
+                <a16:creationId xmlns:a16="http://schemas.microsoft.com/office/drawing/2014/main" id="{97DE75EA-783B-4A37-9C7A-39FAED9F70AD}"/>
+              </a:ext>
+            </a:extLst>
+          </p:cNvPr>
+          <p:cNvSpPr txBox="1"/>
+          <p:nvPr/>
+        </p:nvSpPr>
+        <p:spPr>
+          <a:xfrm>
+            <a:off x="2540063" y="968229"/>
+            <a:ext cx="6603937" cy="338554"/>
+          </a:xfrm>
+          <a:prstGeom prst="rect">
+            <a:avLst/>
+          </a:prstGeom>
+          <a:noFill/>
+        </p:spPr>
+        <p:txBody>
+          <a:bodyPr wrap="square" rtlCol="0">
+            <a:spAutoFit/>
+          </a:bodyPr>
+          <a:lstStyle/>
+          <a:p>
+            <a:pPr marL="227013" indent="-227013">
+              <a:spcBef>
+                <a:spcPts val="300"/>
+              </a:spcBef>
+            </a:pPr>
+            <a:r>
+              <a:rPr lang="en-US" sz="1600" dirty="0">
+                <a:latin typeface="Times New Roman" panose="02020603050405020304" pitchFamily="18" charset="0"/>
+                <a:cs typeface="Times New Roman" panose="02020603050405020304" pitchFamily="18" charset="0"/>
+              </a:rPr>
+              <a:t>for a comparison, see  </a:t>
+            </a:r>
+            <a:r>
+              <a:rPr lang="en-US" sz="1600" dirty="0">
+                <a:latin typeface="Times New Roman" panose="02020603050405020304" pitchFamily="18" charset="0"/>
+                <a:cs typeface="Times New Roman" panose="02020603050405020304" pitchFamily="18" charset="0"/>
+                <a:hlinkClick r:id="rId3"/>
+              </a:rPr>
+              <a:t>https://www.upguard.com/articles/github-vs-bitbucket</a:t>
+            </a:r>
+            <a:r>
+              <a:rPr lang="en-US" sz="1600" dirty="0">
+                <a:latin typeface="Times New Roman" panose="02020603050405020304" pitchFamily="18" charset="0"/>
+                <a:cs typeface="Times New Roman" panose="02020603050405020304" pitchFamily="18" charset="0"/>
+              </a:rPr>
+              <a:t>  </a:t>
+            </a:r>
+          </a:p>
+        </p:txBody>
+      </p:sp>
+    </p:spTree>
+    <p:extLst>
+      <p:ext uri="{BB962C8B-B14F-4D97-AF65-F5344CB8AC3E}">
+        <p14:creationId xmlns:p14="http://schemas.microsoft.com/office/powerpoint/2010/main" val="2274151764"/>
+      </p:ext>
+    </p:extLst>
+  </p:cSld>
+  <p:clrMapOvr>
+    <a:masterClrMapping/>
+  </p:clrMapOvr>
+</p:sld>
+</file>
+
+<file path=ppt/slides/slide15.xml><?xml version="1.0" encoding="utf-8"?>
+<p:sld xmlns:a="http://schemas.openxmlformats.org/drawingml/2006/main" xmlns:r="http://schemas.openxmlformats.org/officeDocument/2006/relationships" xmlns:p="http://schemas.openxmlformats.org/presentationml/2006/main">
+  <p:cSld>
+    <p:spTree>
+      <p:nvGrpSpPr>
+        <p:cNvPr id="1" name=""/>
+        <p:cNvGrpSpPr/>
+        <p:nvPr/>
+      </p:nvGrpSpPr>
+      <p:grpSpPr>
+        <a:xfrm>
+          <a:off x="0" y="0"/>
+          <a:ext cx="0" cy="0"/>
+          <a:chOff x="0" y="0"/>
+          <a:chExt cx="0" cy="0"/>
+        </a:xfrm>
+      </p:grpSpPr>
+      <p:sp>
+        <p:nvSpPr>
+          <p:cNvPr id="2" name="Title 1"/>
+          <p:cNvSpPr>
+            <a:spLocks noGrp="1"/>
+          </p:cNvSpPr>
+          <p:nvPr>
+            <p:ph type="title"/>
+          </p:nvPr>
+        </p:nvSpPr>
+        <p:spPr>
+          <a:xfrm>
+            <a:off x="9111" y="0"/>
+            <a:ext cx="9144000" cy="589085"/>
+          </a:xfrm>
+        </p:spPr>
+        <p:txBody>
+          <a:bodyPr>
+            <a:normAutofit/>
+          </a:bodyPr>
+          <a:lstStyle/>
+          <a:p>
+            <a:r>
+              <a:rPr lang="en-US" dirty="0"/>
+              <a:t>The GitHub ‘issues’ feature</a:t>
+            </a:r>
+            <a:endParaRPr lang="en-US" b="0" dirty="0"/>
+          </a:p>
+        </p:txBody>
+      </p:sp>
+      <p:sp>
+        <p:nvSpPr>
+          <p:cNvPr id="3" name="Content Placeholder 2"/>
+          <p:cNvSpPr>
+            <a:spLocks noGrp="1"/>
+          </p:cNvSpPr>
+          <p:nvPr>
+            <p:ph idx="1"/>
+          </p:nvPr>
+        </p:nvSpPr>
+        <p:spPr>
+          <a:xfrm>
+            <a:off x="276639" y="653144"/>
+            <a:ext cx="8608944" cy="5580508"/>
+          </a:xfrm>
+        </p:spPr>
+        <p:txBody>
+          <a:bodyPr>
+            <a:normAutofit lnSpcReduction="10000"/>
+          </a:bodyPr>
+          <a:lstStyle/>
+          <a:p>
+            <a:r>
+              <a:rPr lang="en-US" dirty="0"/>
+              <a:t>Creating issues is a good thing</a:t>
+            </a:r>
+          </a:p>
+          <a:p>
+            <a:pPr lvl="1"/>
+            <a:r>
+              <a:rPr lang="en-US" dirty="0"/>
+              <a:t>most other tracking systems call them ‘tickets’</a:t>
+            </a:r>
+          </a:p>
+          <a:p>
+            <a:pPr lvl="1"/>
+            <a:r>
+              <a:rPr lang="en-US" dirty="0"/>
+              <a:t>every GitHub repo has it’s own set of issues</a:t>
+            </a:r>
+          </a:p>
+          <a:p>
+            <a:endParaRPr lang="en-US" dirty="0"/>
+          </a:p>
+          <a:p>
+            <a:endParaRPr lang="en-US" dirty="0"/>
+          </a:p>
+          <a:p>
+            <a:endParaRPr lang="en-US" dirty="0"/>
+          </a:p>
+          <a:p>
+            <a:endParaRPr lang="en-US" dirty="0"/>
+          </a:p>
+          <a:p>
+            <a:endParaRPr lang="en-US" dirty="0"/>
+          </a:p>
+          <a:p>
+            <a:endParaRPr lang="en-US" dirty="0"/>
+          </a:p>
+          <a:p>
+            <a:endParaRPr lang="en-US" dirty="0"/>
+          </a:p>
+          <a:p>
+            <a:endParaRPr lang="en-US" dirty="0"/>
+          </a:p>
+          <a:p>
+            <a:endParaRPr lang="en-US" dirty="0"/>
+          </a:p>
+          <a:p>
+            <a:r>
+              <a:rPr lang="en-US" dirty="0"/>
+              <a:t>Issues help you (or a team) keep track of </a:t>
+            </a:r>
+          </a:p>
+          <a:p>
+            <a:pPr lvl="1"/>
+            <a:r>
+              <a:rPr lang="en-US" dirty="0"/>
+              <a:t>tasks, enhancements and bugs</a:t>
+            </a:r>
+          </a:p>
+          <a:p>
+            <a:r>
+              <a:rPr lang="en-US" dirty="0"/>
+              <a:t>They are a very good alternative to email</a:t>
+            </a:r>
+          </a:p>
+          <a:p>
+            <a:pPr lvl="1"/>
+            <a:r>
+              <a:rPr lang="en-US" dirty="0"/>
+              <a:t>they can be shared and discussed with the team</a:t>
+            </a:r>
+          </a:p>
+          <a:p>
+            <a:pPr lvl="1"/>
+            <a:r>
+              <a:rPr lang="en-US" dirty="0"/>
+              <a:t>individuals can turn notifications on/off</a:t>
+            </a:r>
+          </a:p>
+          <a:p>
+            <a:pPr lvl="1"/>
+            <a:r>
+              <a:rPr lang="en-US" dirty="0"/>
+              <a:t>they can be closed and later re-opened</a:t>
+            </a:r>
+          </a:p>
+          <a:p>
+            <a:pPr lvl="1"/>
+            <a:r>
+              <a:rPr lang="en-US" dirty="0"/>
+              <a:t>provides a searchable archive</a:t>
+            </a:r>
+          </a:p>
+        </p:txBody>
+      </p:sp>
+      <p:sp>
+        <p:nvSpPr>
+          <p:cNvPr id="5" name="TextBox 4">
+            <a:extLst>
+              <a:ext uri="{FF2B5EF4-FFF2-40B4-BE49-F238E27FC236}">
+                <a16:creationId xmlns:a16="http://schemas.microsoft.com/office/drawing/2014/main" id="{CD308576-A005-4C8F-A143-C7424700DF8E}"/>
+              </a:ext>
+            </a:extLst>
+          </p:cNvPr>
+          <p:cNvSpPr txBox="1"/>
+          <p:nvPr/>
+        </p:nvSpPr>
+        <p:spPr>
+          <a:xfrm>
+            <a:off x="5320937" y="5681636"/>
+            <a:ext cx="3413760" cy="523220"/>
+          </a:xfrm>
+          <a:prstGeom prst="rect">
+            <a:avLst/>
+          </a:prstGeom>
+          <a:noFill/>
+          <a:ln>
+            <a:solidFill>
+              <a:schemeClr val="tx1"/>
+            </a:solidFill>
+          </a:ln>
+        </p:spPr>
+        <p:txBody>
+          <a:bodyPr wrap="square" rtlCol="0">
+            <a:spAutoFit/>
+          </a:bodyPr>
+          <a:lstStyle/>
+          <a:p>
+            <a:pPr marL="227013" indent="-227013">
+              <a:spcBef>
+                <a:spcPts val="300"/>
+              </a:spcBef>
+            </a:pPr>
+            <a:r>
+              <a:rPr lang="en-US" sz="1400" dirty="0">
+                <a:latin typeface="Times New Roman" panose="02020603050405020304" pitchFamily="18" charset="0"/>
+                <a:cs typeface="Times New Roman" panose="02020603050405020304" pitchFamily="18" charset="0"/>
+              </a:rPr>
+              <a:t>Docs for GitHub issues, </a:t>
+            </a:r>
+            <a:r>
+              <a:rPr lang="en-US" sz="1400" dirty="0">
+                <a:latin typeface="Times New Roman" panose="02020603050405020304" pitchFamily="18" charset="0"/>
+                <a:cs typeface="Times New Roman" panose="02020603050405020304" pitchFamily="18" charset="0"/>
+                <a:hlinkClick r:id="rId3"/>
+              </a:rPr>
+              <a:t>https://guides.github.com/features/issues/</a:t>
+            </a:r>
+            <a:r>
+              <a:rPr lang="en-US" sz="1400" dirty="0">
+                <a:latin typeface="Times New Roman" panose="02020603050405020304" pitchFamily="18" charset="0"/>
+                <a:cs typeface="Times New Roman" panose="02020603050405020304" pitchFamily="18" charset="0"/>
+              </a:rPr>
+              <a:t>  </a:t>
+            </a:r>
+          </a:p>
+        </p:txBody>
+      </p:sp>
+      <p:pic>
+        <p:nvPicPr>
+          <p:cNvPr id="6" name="Picture 5">
+            <a:extLst>
+              <a:ext uri="{FF2B5EF4-FFF2-40B4-BE49-F238E27FC236}">
+                <a16:creationId xmlns:a16="http://schemas.microsoft.com/office/drawing/2014/main" id="{5EE6744C-FA67-4A13-8455-F991CC994010}"/>
+              </a:ext>
+            </a:extLst>
+          </p:cNvPr>
+          <p:cNvPicPr>
+            <a:picLocks noChangeAspect="1"/>
+          </p:cNvPicPr>
+          <p:nvPr/>
+        </p:nvPicPr>
+        <p:blipFill>
+          <a:blip r:embed="rId4"/>
+          <a:stretch>
+            <a:fillRect/>
+          </a:stretch>
+        </p:blipFill>
+        <p:spPr>
+          <a:xfrm>
+            <a:off x="3455340" y="1595033"/>
+            <a:ext cx="5209689" cy="2577053"/>
+          </a:xfrm>
+          <a:prstGeom prst="rect">
+            <a:avLst/>
+          </a:prstGeom>
+        </p:spPr>
+      </p:pic>
+    </p:spTree>
+    <p:extLst>
+      <p:ext uri="{BB962C8B-B14F-4D97-AF65-F5344CB8AC3E}">
+        <p14:creationId xmlns:p14="http://schemas.microsoft.com/office/powerpoint/2010/main" val="1626106878"/>
+      </p:ext>
+    </p:extLst>
+  </p:cSld>
+  <p:clrMapOvr>
+    <a:masterClrMapping/>
+  </p:clrMapOvr>
+</p:sld>
+</file>
+
+<file path=ppt/slides/slide16.xml><?xml version="1.0" encoding="utf-8"?>
+<p:sld xmlns:a="http://schemas.openxmlformats.org/drawingml/2006/main" xmlns:r="http://schemas.openxmlformats.org/officeDocument/2006/relationships" xmlns:p="http://schemas.openxmlformats.org/presentationml/2006/main">
+  <p:cSld>
+    <p:spTree>
+      <p:nvGrpSpPr>
+        <p:cNvPr id="1" name=""/>
+        <p:cNvGrpSpPr/>
+        <p:nvPr/>
+      </p:nvGrpSpPr>
+      <p:grpSpPr>
+        <a:xfrm>
+          <a:off x="0" y="0"/>
+          <a:ext cx="0" cy="0"/>
+          <a:chOff x="0" y="0"/>
+          <a:chExt cx="0" cy="0"/>
+        </a:xfrm>
+      </p:grpSpPr>
+      <p:sp>
+        <p:nvSpPr>
+          <p:cNvPr id="2" name="Title 1"/>
+          <p:cNvSpPr>
+            <a:spLocks noGrp="1"/>
+          </p:cNvSpPr>
+          <p:nvPr>
+            <p:ph type="title"/>
+          </p:nvPr>
+        </p:nvSpPr>
+        <p:spPr>
+          <a:xfrm>
+            <a:off x="0" y="156754"/>
+            <a:ext cx="9144000" cy="589085"/>
+          </a:xfrm>
+        </p:spPr>
+        <p:txBody>
+          <a:bodyPr>
+            <a:normAutofit/>
+          </a:bodyPr>
+          <a:lstStyle/>
+          <a:p>
+            <a:r>
+              <a:rPr lang="en-US" dirty="0"/>
+              <a:t>An example GitHub code repository</a:t>
+            </a:r>
+            <a:endParaRPr lang="en-US" b="0" dirty="0"/>
+          </a:p>
+        </p:txBody>
+      </p:sp>
+      <p:sp>
+        <p:nvSpPr>
+          <p:cNvPr id="3" name="Content Placeholder 2"/>
+          <p:cNvSpPr>
+            <a:spLocks noGrp="1"/>
+          </p:cNvSpPr>
+          <p:nvPr>
+            <p:ph idx="1"/>
+          </p:nvPr>
+        </p:nvSpPr>
+        <p:spPr>
+          <a:xfrm>
+            <a:off x="276639" y="940526"/>
+            <a:ext cx="8608944" cy="5293126"/>
+          </a:xfrm>
+        </p:spPr>
+        <p:txBody>
+          <a:bodyPr>
+            <a:normAutofit/>
+          </a:bodyPr>
+          <a:lstStyle/>
+          <a:p>
+            <a:r>
+              <a:rPr lang="en-US" dirty="0">
+                <a:latin typeface="Courier New" panose="02070309020205020404" pitchFamily="49" charset="0"/>
+                <a:cs typeface="Courier New" panose="02070309020205020404" pitchFamily="49" charset="0"/>
+              </a:rPr>
+              <a:t>rsbeams</a:t>
+            </a:r>
+            <a:r>
+              <a:rPr lang="en-US" dirty="0"/>
+              <a:t> is a python library for 3D particle beams</a:t>
+            </a:r>
+          </a:p>
+          <a:p>
+            <a:pPr marL="457200" lvl="1" indent="0">
+              <a:buNone/>
+            </a:pPr>
+            <a:r>
+              <a:rPr lang="en-US" dirty="0">
+                <a:latin typeface="Courier New" panose="02070309020205020404" pitchFamily="49" charset="0"/>
+                <a:cs typeface="Courier New" panose="02070309020205020404" pitchFamily="49" charset="0"/>
+              </a:rPr>
+              <a:t>rsbeams:     </a:t>
+            </a:r>
+            <a:r>
+              <a:rPr lang="en-US" dirty="0">
+                <a:cs typeface="Courier New" panose="02070309020205020404" pitchFamily="49" charset="0"/>
+                <a:hlinkClick r:id="rId3"/>
+              </a:rPr>
+              <a:t>https://github.com/radiasoft/rsbeams</a:t>
+            </a:r>
+            <a:r>
+              <a:rPr lang="en-US" dirty="0">
+                <a:cs typeface="Courier New" panose="02070309020205020404" pitchFamily="49" charset="0"/>
+              </a:rPr>
+              <a:t> </a:t>
+            </a:r>
+            <a:endParaRPr lang="en-US" dirty="0"/>
+          </a:p>
+          <a:p>
+            <a:pPr lvl="1"/>
+            <a:r>
+              <a:rPr lang="en-US" dirty="0"/>
+              <a:t>not specific to any particular tracking code</a:t>
+            </a:r>
+          </a:p>
+          <a:p>
+            <a:r>
+              <a:rPr lang="en-US" dirty="0">
+                <a:latin typeface="Courier New" panose="02070309020205020404" pitchFamily="49" charset="0"/>
+                <a:cs typeface="Courier New" panose="02070309020205020404" pitchFamily="49" charset="0"/>
+              </a:rPr>
+              <a:t>rsbeams</a:t>
+            </a:r>
+            <a:r>
+              <a:rPr lang="en-US" dirty="0"/>
+              <a:t> is used by other Python libraries, which </a:t>
+            </a:r>
+            <a:r>
+              <a:rPr lang="en-US" b="1" i="1" dirty="0"/>
+              <a:t>are</a:t>
+            </a:r>
+            <a:r>
+              <a:rPr lang="en-US" dirty="0"/>
+              <a:t> code specific</a:t>
+            </a:r>
+          </a:p>
+          <a:p>
+            <a:pPr marL="457200" lvl="1" indent="0">
+              <a:buNone/>
+            </a:pPr>
+            <a:r>
+              <a:rPr lang="en-US" dirty="0">
+                <a:latin typeface="Courier New" panose="02070309020205020404" pitchFamily="49" charset="0"/>
+                <a:cs typeface="Courier New" panose="02070309020205020404" pitchFamily="49" charset="0"/>
+              </a:rPr>
+              <a:t>rswarp:      </a:t>
+            </a:r>
+            <a:r>
+              <a:rPr lang="en-US" dirty="0">
+                <a:hlinkClick r:id="rId4"/>
+              </a:rPr>
+              <a:t>https://github.com/radiasoft/rswarp</a:t>
+            </a:r>
+            <a:r>
+              <a:rPr lang="en-US" dirty="0"/>
+              <a:t> </a:t>
+            </a:r>
+          </a:p>
+          <a:p>
+            <a:pPr marL="457200" lvl="1" indent="0">
+              <a:buNone/>
+            </a:pPr>
+            <a:r>
+              <a:rPr lang="en-US" dirty="0">
+                <a:latin typeface="Courier New" panose="02070309020205020404" pitchFamily="49" charset="0"/>
+                <a:cs typeface="Courier New" panose="02070309020205020404" pitchFamily="49" charset="0"/>
+              </a:rPr>
+              <a:t>rssynergia:  </a:t>
+            </a:r>
+            <a:r>
+              <a:rPr lang="en-US" dirty="0">
+                <a:hlinkClick r:id="rId5"/>
+              </a:rPr>
+              <a:t>https://github.com/radiasoft/rssynergia</a:t>
+            </a:r>
+            <a:r>
+              <a:rPr lang="en-US" dirty="0"/>
+              <a:t> </a:t>
+            </a:r>
+          </a:p>
+          <a:p>
+            <a:r>
+              <a:rPr lang="en-US" dirty="0"/>
+              <a:t>In the Computer Lab this afternoon &amp; tomorrow, you will</a:t>
+            </a:r>
+          </a:p>
+          <a:p>
+            <a:pPr lvl="1"/>
+            <a:r>
+              <a:rPr lang="en-US" dirty="0"/>
+              <a:t>fork this repo to your own GitHub account</a:t>
+            </a:r>
+          </a:p>
+          <a:p>
+            <a:pPr lvl="1"/>
+            <a:r>
+              <a:rPr lang="en-US" dirty="0"/>
+              <a:t>clone this forked repo to your laptop or desktop</a:t>
+            </a:r>
+          </a:p>
+          <a:p>
+            <a:pPr lvl="1"/>
+            <a:r>
+              <a:rPr lang="en-US" dirty="0"/>
+              <a:t>decide what part of the code you would like to test</a:t>
+            </a:r>
+          </a:p>
+          <a:p>
+            <a:pPr lvl="1"/>
+            <a:r>
+              <a:rPr lang="en-US" dirty="0"/>
+              <a:t>create an ‘issue’ in the original repo regarding your plan to create a test</a:t>
+            </a:r>
+          </a:p>
+          <a:p>
+            <a:pPr lvl="1"/>
+            <a:r>
+              <a:rPr lang="en-US" dirty="0"/>
+              <a:t>create a branch in your working directory</a:t>
+            </a:r>
+          </a:p>
+          <a:p>
+            <a:pPr lvl="1"/>
+            <a:r>
+              <a:rPr lang="en-US" dirty="0"/>
+              <a:t>create/add/commit the test in your branch</a:t>
+            </a:r>
+          </a:p>
+          <a:p>
+            <a:pPr lvl="1"/>
+            <a:r>
+              <a:rPr lang="en-US" dirty="0"/>
+              <a:t>merge your branch into the ‘master’ branch of your forked repo on GitHub</a:t>
+            </a:r>
+          </a:p>
+          <a:p>
+            <a:pPr lvl="1"/>
+            <a:r>
+              <a:rPr lang="en-US" dirty="0"/>
+              <a:t>Issue a ‘pull request’ to the original repository</a:t>
+            </a:r>
+          </a:p>
+          <a:p>
+            <a:r>
+              <a:rPr lang="en-US" dirty="0"/>
+              <a:t>We won’t cover all this material today</a:t>
+            </a:r>
+          </a:p>
+        </p:txBody>
+      </p:sp>
+    </p:spTree>
+    <p:extLst>
+      <p:ext uri="{BB962C8B-B14F-4D97-AF65-F5344CB8AC3E}">
+        <p14:creationId xmlns:p14="http://schemas.microsoft.com/office/powerpoint/2010/main" val="2848293249"/>
+      </p:ext>
+    </p:extLst>
+  </p:cSld>
+  <p:clrMapOvr>
+    <a:masterClrMapping/>
+  </p:clrMapOvr>
+</p:sld>
+</file>
+
+<file path=ppt/slides/slide17.xml><?xml version="1.0" encoding="utf-8"?>
+<p:sld xmlns:a="http://schemas.openxmlformats.org/drawingml/2006/main" xmlns:r="http://schemas.openxmlformats.org/officeDocument/2006/relationships" xmlns:p="http://schemas.openxmlformats.org/presentationml/2006/main">
+  <p:cSld>
+    <p:spTree>
+      <p:nvGrpSpPr>
+        <p:cNvPr id="1" name=""/>
+        <p:cNvGrpSpPr/>
+        <p:nvPr/>
+      </p:nvGrpSpPr>
+      <p:grpSpPr>
+        <a:xfrm>
+          <a:off x="0" y="0"/>
+          <a:ext cx="0" cy="0"/>
+          <a:chOff x="0" y="0"/>
+          <a:chExt cx="0" cy="0"/>
+        </a:xfrm>
+      </p:grpSpPr>
+      <p:sp>
+        <p:nvSpPr>
+          <p:cNvPr id="2" name="Title 1"/>
+          <p:cNvSpPr>
+            <a:spLocks noGrp="1"/>
+          </p:cNvSpPr>
+          <p:nvPr>
+            <p:ph type="title"/>
+          </p:nvPr>
+        </p:nvSpPr>
+        <p:spPr>
+          <a:xfrm>
+            <a:off x="0" y="0"/>
+            <a:ext cx="6975566" cy="589085"/>
+          </a:xfrm>
+        </p:spPr>
+        <p:txBody>
+          <a:bodyPr>
+            <a:normAutofit/>
+          </a:bodyPr>
+          <a:lstStyle/>
+          <a:p>
+            <a:r>
+              <a:rPr lang="en-US" dirty="0"/>
+              <a:t>An overview of the  </a:t>
+            </a:r>
+            <a:r>
+              <a:rPr lang="en-US" b="0" i="0" dirty="0">
+                <a:latin typeface="Courier New" panose="02070309020205020404" pitchFamily="49" charset="0"/>
+                <a:cs typeface="Courier New" panose="02070309020205020404" pitchFamily="49" charset="0"/>
+              </a:rPr>
+              <a:t>rsbeams </a:t>
+            </a:r>
+            <a:r>
+              <a:rPr lang="en-US" dirty="0"/>
+              <a:t> repository</a:t>
+            </a:r>
+            <a:endParaRPr lang="en-US" b="0" dirty="0"/>
+          </a:p>
+        </p:txBody>
+      </p:sp>
+      <p:pic>
+        <p:nvPicPr>
+          <p:cNvPr id="6" name="Picture 5">
+            <a:extLst>
+              <a:ext uri="{FF2B5EF4-FFF2-40B4-BE49-F238E27FC236}">
+                <a16:creationId xmlns:a16="http://schemas.microsoft.com/office/drawing/2014/main" id="{83AE9FC8-F2A3-401F-B5FC-187CEEEBD10E}"/>
+              </a:ext>
+            </a:extLst>
+          </p:cNvPr>
+          <p:cNvPicPr>
+            <a:picLocks noChangeAspect="1"/>
+          </p:cNvPicPr>
+          <p:nvPr/>
+        </p:nvPicPr>
+        <p:blipFill>
+          <a:blip r:embed="rId3"/>
+          <a:stretch>
+            <a:fillRect/>
+          </a:stretch>
+        </p:blipFill>
+        <p:spPr>
+          <a:xfrm>
+            <a:off x="1593668" y="553686"/>
+            <a:ext cx="7377271" cy="5750627"/>
+          </a:xfrm>
+          <a:prstGeom prst="rect">
+            <a:avLst/>
+          </a:prstGeom>
+        </p:spPr>
+      </p:pic>
+    </p:spTree>
+    <p:extLst>
+      <p:ext uri="{BB962C8B-B14F-4D97-AF65-F5344CB8AC3E}">
+        <p14:creationId xmlns:p14="http://schemas.microsoft.com/office/powerpoint/2010/main" val="355498105"/>
+      </p:ext>
+    </p:extLst>
+  </p:cSld>
+  <p:clrMapOvr>
+    <a:masterClrMapping/>
+  </p:clrMapOvr>
+</p:sld>
+</file>
+
+<file path=ppt/slides/slide18.xml><?xml version="1.0" encoding="utf-8"?>
+<p:sld xmlns:a="http://schemas.openxmlformats.org/drawingml/2006/main" xmlns:r="http://schemas.openxmlformats.org/officeDocument/2006/relationships" xmlns:p="http://schemas.openxmlformats.org/presentationml/2006/main">
+  <p:cSld>
+    <p:spTree>
+      <p:nvGrpSpPr>
+        <p:cNvPr id="1" name=""/>
+        <p:cNvGrpSpPr/>
+        <p:nvPr/>
+      </p:nvGrpSpPr>
+      <p:grpSpPr>
+        <a:xfrm>
+          <a:off x="0" y="0"/>
+          <a:ext cx="0" cy="0"/>
+          <a:chOff x="0" y="0"/>
+          <a:chExt cx="0" cy="0"/>
+        </a:xfrm>
+      </p:grpSpPr>
+      <p:sp>
+        <p:nvSpPr>
+          <p:cNvPr id="2" name="Title 1"/>
+          <p:cNvSpPr>
+            <a:spLocks noGrp="1"/>
+          </p:cNvSpPr>
+          <p:nvPr>
+            <p:ph type="title"/>
+          </p:nvPr>
+        </p:nvSpPr>
+        <p:spPr>
+          <a:xfrm>
             <a:off x="0" y="70385"/>
             <a:ext cx="9144000" cy="589085"/>
           </a:xfrm>
@@ -4424,33 +6522,83 @@
           <a:p>
             <a:r>
               <a:rPr lang="en-US" dirty="0"/>
-              <a:t>TBD…</a:t>
-            </a:r>
-          </a:p>
-          <a:p>
-            <a:pPr lvl="1"/>
+              <a:t>Any final questions regarding the material in this lecture?</a:t>
+            </a:r>
+          </a:p>
+          <a:p>
             <a:endParaRPr lang="en-US" dirty="0"/>
           </a:p>
           <a:p>
             <a:r>
               <a:rPr lang="en-US" dirty="0"/>
-              <a:t>Any final questions regarding the material in this lecture?</a:t>
-            </a:r>
-          </a:p>
-          <a:p>
+              <a:t>In the Computer Lab this afternoon, you will</a:t>
+            </a:r>
+          </a:p>
+          <a:p>
+            <a:pPr lvl="1"/>
+            <a:r>
+              <a:rPr lang="en-US" dirty="0"/>
+              <a:t>fork this repo to your own GitHub account</a:t>
+            </a:r>
+          </a:p>
+          <a:p>
+            <a:pPr lvl="1"/>
+            <a:r>
+              <a:rPr lang="en-US" dirty="0"/>
+              <a:t>clone this forked repo to your laptop or desktop</a:t>
+            </a:r>
+          </a:p>
+          <a:p>
+            <a:pPr lvl="1"/>
+            <a:r>
+              <a:rPr lang="en-US" dirty="0"/>
+              <a:t>document each of the following with an issue:</a:t>
+            </a:r>
+          </a:p>
+          <a:p>
+            <a:pPr lvl="2"/>
+            <a:r>
+              <a:rPr lang="en-US" dirty="0"/>
+              <a:t>run the existing tests</a:t>
+            </a:r>
+          </a:p>
+          <a:p>
+            <a:pPr lvl="2"/>
+            <a:r>
+              <a:rPr lang="en-US" dirty="0"/>
+              <a:t>create a branch</a:t>
+            </a:r>
+          </a:p>
+          <a:p>
+            <a:pPr lvl="3"/>
+            <a:r>
+              <a:rPr lang="en-US" dirty="0"/>
+              <a:t>create a new example, based on one of the existing tests</a:t>
+            </a:r>
+          </a:p>
+          <a:p>
+            <a:pPr lvl="3"/>
+            <a:r>
+              <a:rPr lang="en-US" dirty="0"/>
+              <a:t>merge the branch back into ‘master’</a:t>
+            </a:r>
+          </a:p>
+          <a:p>
+            <a:pPr lvl="3"/>
             <a:endParaRPr lang="en-US" dirty="0"/>
           </a:p>
           <a:p>
-            <a:r>
-              <a:rPr lang="en-US" dirty="0"/>
-              <a:t>Computer Lab this afternoon – </a:t>
-            </a:r>
-          </a:p>
-          <a:p>
-            <a:pPr lvl="1"/>
-            <a:r>
-              <a:rPr lang="en-US" dirty="0"/>
-              <a:t>TBD…</a:t>
+            <a:pPr lvl="1"/>
+            <a:r>
+              <a:rPr lang="en-US" dirty="0"/>
+              <a:t>decide what part of the code you would like to test</a:t>
+            </a:r>
+          </a:p>
+          <a:p>
+            <a:pPr lvl="2"/>
+            <a:r>
+              <a:rPr lang="en-US" dirty="0"/>
+              <a:t>create an ‘issue’ in the original repo regarding your plan to create a test</a:t>
             </a:r>
           </a:p>
         </p:txBody>
@@ -5230,7 +7378,7 @@
         </p:spPr>
         <p:txBody>
           <a:bodyPr>
-            <a:normAutofit/>
+            <a:normAutofit lnSpcReduction="10000"/>
           </a:bodyPr>
           <a:lstStyle/>
           <a:p>
@@ -5299,6 +7447,17 @@
             <a:r>
               <a:rPr lang="en-US" dirty="0"/>
               <a:t>if it has a good CL environment, with git installed</a:t>
+            </a:r>
+          </a:p>
+          <a:p>
+            <a:pPr lvl="1"/>
+            <a:r>
+              <a:rPr lang="en-US" dirty="0" err="1"/>
+              <a:t>PyCharm</a:t>
+            </a:r>
+            <a:r>
+              <a:rPr lang="en-US" dirty="0"/>
+              <a:t> supports interaction with git, GitHub and other VCS options</a:t>
             </a:r>
           </a:p>
           <a:p>
@@ -5393,7 +7552,7 @@
         </p:nvSpPr>
         <p:spPr>
           <a:xfrm>
-            <a:off x="9111" y="-7374"/>
+            <a:off x="9111" y="79716"/>
             <a:ext cx="9144000" cy="589085"/>
           </a:xfrm>
         </p:spPr>
@@ -5426,7 +7585,7 @@
         </p:nvSpPr>
         <p:spPr>
           <a:xfrm>
-            <a:off x="276639" y="644434"/>
+            <a:off x="276639" y="731524"/>
             <a:ext cx="8608944" cy="5773783"/>
           </a:xfrm>
         </p:spPr>
@@ -5438,15 +7597,7 @@
           <a:p>
             <a:r>
               <a:rPr lang="en-US" dirty="0"/>
-              <a:t>The git CLI is not intuitive, compared to central model applications (e.g. </a:t>
-            </a:r>
-            <a:r>
-              <a:rPr lang="en-US" dirty="0" err="1"/>
-              <a:t>svn</a:t>
-            </a:r>
-            <a:r>
-              <a:rPr lang="en-US" dirty="0"/>
-              <a:t>)</a:t>
+              <a:t>The git CLI is not intuitive, compared to central model applications (e.g. svn)</a:t>
             </a:r>
           </a:p>
           <a:p>
@@ -5457,6 +7608,10 @@
             </a:r>
           </a:p>
           <a:p>
+            <a:pPr lvl="1"/>
+            <a:endParaRPr lang="en-US" dirty="0"/>
+          </a:p>
+          <a:p>
             <a:r>
               <a:rPr lang="en-US" dirty="0"/>
               <a:t>The git commit tree</a:t>
@@ -5466,7 +7621,7 @@
             <a:pPr lvl="1"/>
             <a:r>
               <a:rPr lang="en-US" dirty="0"/>
-              <a:t>information stored within a git repository is representable as a graph</a:t>
+              <a:t>information is representable as a graph</a:t>
             </a:r>
           </a:p>
           <a:p>
@@ -5545,15 +7700,9 @@
             <a:endParaRPr lang="en-US" dirty="0"/>
           </a:p>
           <a:p>
-            <a:pPr lvl="2"/>
-            <a:endParaRPr lang="en-US" dirty="0"/>
-          </a:p>
-          <a:p>
-            <a:pPr lvl="2"/>
-            <a:endParaRPr lang="en-US" dirty="0"/>
-          </a:p>
-          <a:p>
-            <a:pPr lvl="2"/>
+            <a:pPr marL="914400" lvl="2" indent="0">
+              <a:buNone/>
+            </a:pPr>
             <a:endParaRPr lang="en-US" dirty="0"/>
           </a:p>
           <a:p>
@@ -5659,7 +7808,7 @@
         </p:blipFill>
         <p:spPr>
           <a:xfrm>
-            <a:off x="5155475" y="1738921"/>
+            <a:off x="5068389" y="1503794"/>
             <a:ext cx="3629432" cy="2339760"/>
           </a:xfrm>
           <a:prstGeom prst="rect">
@@ -6052,7 +8201,7 @@
           <a:p>
             <a:r>
               <a:rPr lang="en-US" dirty="0"/>
-              <a:t>git – Creating a Branch</a:t>
+              <a:t>git – the Checkout command</a:t>
             </a:r>
             <a:endParaRPr lang="en-US" b="0" dirty="0"/>
           </a:p>
@@ -6070,53 +8219,77 @@
         </p:nvSpPr>
         <p:spPr>
           <a:xfrm>
-            <a:off x="276639" y="827314"/>
-            <a:ext cx="8608944" cy="5406337"/>
+            <a:off x="276639" y="729758"/>
+            <a:ext cx="8608944" cy="5503894"/>
           </a:xfrm>
         </p:spPr>
         <p:txBody>
           <a:bodyPr>
-            <a:normAutofit fontScale="92500" lnSpcReduction="20000"/>
+            <a:normAutofit/>
           </a:bodyPr>
           <a:lstStyle/>
           <a:p>
             <a:r>
               <a:rPr lang="en-US" dirty="0"/>
-              <a:t>Branches provide a way to track different sets of changes on the same repo</a:t>
-            </a:r>
-          </a:p>
-          <a:p>
-            <a:pPr lvl="1"/>
-            <a:r>
-              <a:rPr lang="en-US" dirty="0"/>
-              <a:t>With no conflicts from concurrent modifications to the same part of the repo</a:t>
-            </a:r>
-          </a:p>
-          <a:p>
-            <a:pPr lvl="1"/>
-            <a:r>
-              <a:rPr lang="en-US" dirty="0"/>
-              <a:t>a branch is a ref, pointing to latest commit in a ‘branch’ of the commit tree</a:t>
-            </a:r>
-          </a:p>
-          <a:p>
-            <a:r>
-              <a:rPr lang="en-US" dirty="0"/>
-              <a:t>In our example repo (see figure on slide #6), we start with two branches</a:t>
-            </a:r>
-          </a:p>
-          <a:p>
-            <a:pPr lvl="1"/>
-            <a:r>
-              <a:rPr lang="en-US" dirty="0"/>
-              <a:t>my_branch  &amp;  master</a:t>
-            </a:r>
-          </a:p>
-          <a:p>
-            <a:pPr lvl="1"/>
-            <a:r>
-              <a:rPr lang="en-US" dirty="0"/>
-              <a:t>both initially point to the same address, </a:t>
+              <a:t>It changes the </a:t>
+            </a:r>
+            <a:r>
+              <a:rPr lang="en-US" dirty="0">
+                <a:latin typeface="Courier New" panose="02070309020205020404" pitchFamily="49" charset="0"/>
+                <a:cs typeface="Courier New" panose="02070309020205020404" pitchFamily="49" charset="0"/>
+              </a:rPr>
+              <a:t>HEAD</a:t>
+            </a:r>
+            <a:r>
+              <a:rPr lang="en-US" dirty="0"/>
+              <a:t> reference, making it point to a new address</a:t>
+            </a:r>
+          </a:p>
+          <a:p>
+            <a:pPr lvl="1"/>
+            <a:r>
+              <a:rPr lang="en-US" dirty="0"/>
+              <a:t>affects only the working directory</a:t>
+            </a:r>
+          </a:p>
+          <a:p>
+            <a:pPr lvl="1"/>
+            <a:r>
+              <a:rPr lang="en-US" dirty="0"/>
+              <a:t>secondary use:  undo changes in the working directory</a:t>
+            </a:r>
+          </a:p>
+          <a:p>
+            <a:pPr marL="801688" indent="0">
+              <a:buNone/>
+            </a:pPr>
+            <a:r>
+              <a:rPr lang="en-US" sz="1600" dirty="0">
+                <a:latin typeface="Courier New" panose="02070309020205020404" pitchFamily="49" charset="0"/>
+                <a:cs typeface="Courier New" panose="02070309020205020404" pitchFamily="49" charset="0"/>
+              </a:rPr>
+              <a:t>$ git checkout [&lt;options&gt;] &lt;branch&gt;</a:t>
+            </a:r>
+          </a:p>
+          <a:p>
+            <a:pPr lvl="2"/>
+            <a:endParaRPr lang="en-US" dirty="0"/>
+          </a:p>
+          <a:p>
+            <a:pPr lvl="2"/>
+            <a:endParaRPr lang="en-US" dirty="0"/>
+          </a:p>
+          <a:p>
+            <a:r>
+              <a:rPr lang="en-US" dirty="0"/>
+              <a:t>Useful examples:</a:t>
+            </a:r>
+          </a:p>
+          <a:p>
+            <a:pPr lvl="1"/>
+            <a:r>
+              <a:rPr lang="en-US" dirty="0"/>
+              <a:t>get latest commit from the  </a:t>
             </a:r>
             <a:r>
               <a:rPr lang="en-US" sz="1800" dirty="0">
@@ -6126,63 +8299,43 @@
                 <a:latin typeface="Courier New" panose="02070309020205020404" pitchFamily="49" charset="0"/>
                 <a:cs typeface="Courier New" panose="02070309020205020404" pitchFamily="49" charset="0"/>
               </a:rPr>
-              <a:t>2d52a68</a:t>
-            </a:r>
-            <a:endParaRPr lang="en-US" dirty="0"/>
-          </a:p>
-          <a:p>
-            <a:pPr lvl="1"/>
-            <a:r>
-              <a:rPr lang="en-US" dirty="0"/>
-              <a:t>after changes in each branch occur separately, we see they have diverged</a:t>
-            </a:r>
-          </a:p>
-          <a:p>
-            <a:pPr lvl="2"/>
-            <a:r>
-              <a:rPr lang="en-US" dirty="0"/>
-              <a:t>addresses </a:t>
-            </a:r>
-            <a:r>
-              <a:rPr lang="en-US" sz="1600" b="0" dirty="0">
+              <a:t>master</a:t>
+            </a:r>
+            <a:r>
+              <a:rPr lang="en-US" dirty="0"/>
+              <a:t>  branch for use in currently active branch</a:t>
+            </a:r>
+          </a:p>
+          <a:p>
+            <a:pPr marL="801688" indent="0">
+              <a:buNone/>
+            </a:pPr>
+            <a:r>
+              <a:rPr lang="en-US" sz="1600" dirty="0">
+                <a:latin typeface="Courier New" panose="02070309020205020404" pitchFamily="49" charset="0"/>
+                <a:cs typeface="Courier New" panose="02070309020205020404" pitchFamily="49" charset="0"/>
+              </a:rPr>
+              <a:t>$ git checkout master</a:t>
+            </a:r>
+          </a:p>
+          <a:p>
+            <a:pPr lvl="1"/>
+            <a:r>
+              <a:rPr lang="en-US" dirty="0"/>
+              <a:t>get an address (e.g. </a:t>
+            </a:r>
+            <a:r>
+              <a:rPr lang="en-US" dirty="0">
                 <a:solidFill>
-                  <a:schemeClr val="tx1"/>
+                  <a:srgbClr val="000000"/>
                 </a:solidFill>
                 <a:latin typeface="Courier New" panose="02070309020205020404" pitchFamily="49" charset="0"/>
-                <a:cs typeface="Courier New" panose="02070309020205020404" pitchFamily="49" charset="0"/>
-              </a:rPr>
-              <a:t>243742d</a:t>
-            </a:r>
-            <a:r>
-              <a:rPr lang="en-US" dirty="0"/>
-              <a:t>  &amp;  </a:t>
-            </a:r>
-            <a:r>
-              <a:rPr lang="en-US" sz="1600" b="0" dirty="0">
-                <a:solidFill>
-                  <a:schemeClr val="tx1"/>
-                </a:solidFill>
-                <a:latin typeface="Courier New" panose="02070309020205020404" pitchFamily="49" charset="0"/>
-                <a:cs typeface="Courier New" panose="02070309020205020404" pitchFamily="49" charset="0"/>
-              </a:rPr>
-              <a:t>04d25ed</a:t>
-            </a:r>
-            <a:r>
-              <a:rPr lang="en-US" dirty="0"/>
-              <a:t> respectively.</a:t>
-            </a:r>
-          </a:p>
-          <a:p>
-            <a:r>
-              <a:rPr lang="en-US" dirty="0"/>
-              <a:t>Examples of using the ‘branch’ command:</a:t>
-            </a:r>
-          </a:p>
-          <a:p>
-            <a:pPr lvl="1"/>
-            <a:r>
-              <a:rPr lang="en-US" dirty="0"/>
-              <a:t>Create new branch  </a:t>
+              </a:rPr>
+              <a:t>2d52a68</a:t>
+            </a:r>
+            <a:r>
+              <a:rPr lang="en-US" dirty="0"/>
+              <a:t>) and label it as branch  </a:t>
             </a:r>
             <a:r>
               <a:rPr lang="en-US" sz="1800" dirty="0">
@@ -6192,21 +8345,7 @@
                 <a:latin typeface="Courier New" panose="02070309020205020404" pitchFamily="49" charset="0"/>
                 <a:cs typeface="Courier New" panose="02070309020205020404" pitchFamily="49" charset="0"/>
               </a:rPr>
-              <a:t>branch_name</a:t>
-            </a:r>
-            <a:r>
-              <a:rPr lang="en-US" dirty="0"/>
-              <a:t>  pointing to same address as  </a:t>
-            </a:r>
-            <a:r>
-              <a:rPr lang="en-US" sz="1800" dirty="0">
-                <a:solidFill>
-                  <a:schemeClr val="tx1"/>
-                </a:solidFill>
-                <a:latin typeface="Courier New" panose="02070309020205020404" pitchFamily="49" charset="0"/>
-                <a:cs typeface="Courier New" panose="02070309020205020404" pitchFamily="49" charset="0"/>
-              </a:rPr>
-              <a:t>HEAD</a:t>
+              <a:t>new_branch_name</a:t>
             </a:r>
             <a:endParaRPr lang="en-US" dirty="0">
               <a:solidFill>
@@ -6225,71 +8364,14 @@
                 <a:latin typeface="Courier New" panose="02070309020205020404" pitchFamily="49" charset="0"/>
                 <a:cs typeface="Courier New" panose="02070309020205020404" pitchFamily="49" charset="0"/>
               </a:rPr>
-              <a:t>$ git branch branch_name</a:t>
-            </a:r>
-          </a:p>
-          <a:p>
-            <a:pPr lvl="1"/>
-            <a:r>
-              <a:rPr lang="en-US" dirty="0"/>
-              <a:t>List local branches</a:t>
-            </a:r>
-          </a:p>
-          <a:p>
-            <a:pPr marL="801688" indent="0">
-              <a:buNone/>
-            </a:pPr>
-            <a:r>
-              <a:rPr lang="en-US" sz="1600" dirty="0">
-                <a:latin typeface="Courier New" panose="02070309020205020404" pitchFamily="49" charset="0"/>
-                <a:cs typeface="Courier New" panose="02070309020205020404" pitchFamily="49" charset="0"/>
-              </a:rPr>
-              <a:t>$ git branch</a:t>
-            </a:r>
-          </a:p>
-          <a:p>
-            <a:pPr lvl="1"/>
-            <a:r>
-              <a:rPr lang="en-US" dirty="0"/>
-              <a:t>List remote branches</a:t>
-            </a:r>
-          </a:p>
-          <a:p>
-            <a:pPr marL="801688" indent="0">
-              <a:buNone/>
-            </a:pPr>
-            <a:r>
-              <a:rPr lang="en-US" sz="1600" dirty="0">
-                <a:latin typeface="Courier New" panose="02070309020205020404" pitchFamily="49" charset="0"/>
-                <a:cs typeface="Courier New" panose="02070309020205020404" pitchFamily="49" charset="0"/>
-              </a:rPr>
-              <a:t>$ git branch -r</a:t>
-            </a:r>
-          </a:p>
-          <a:p>
-            <a:pPr lvl="1"/>
-            <a:r>
-              <a:rPr lang="en-US" dirty="0"/>
-              <a:t>Delete branch named 'branch_name'</a:t>
-            </a:r>
-          </a:p>
-          <a:p>
-            <a:pPr marL="801688" indent="0">
-              <a:buNone/>
-            </a:pPr>
-            <a:r>
-              <a:rPr lang="en-US" sz="1600" dirty="0">
-                <a:latin typeface="Courier New" panose="02070309020205020404" pitchFamily="49" charset="0"/>
-                <a:cs typeface="Courier New" panose="02070309020205020404" pitchFamily="49" charset="0"/>
-              </a:rPr>
-              <a:t>$ git branch -d branch_name</a:t>
-            </a:r>
-          </a:p>
-          <a:p>
-            <a:pPr lvl="1"/>
-            <a:r>
-              <a:rPr lang="en-US" dirty="0"/>
-              <a:t>Rename the branch  </a:t>
+              <a:t>$ git checkout -b new_branch_name 2d52a68</a:t>
+            </a:r>
+          </a:p>
+          <a:p>
+            <a:pPr lvl="1"/>
+            <a:r>
+              <a:rPr lang="en-US" dirty="0"/>
+              <a:t>force a checkout from </a:t>
             </a:r>
             <a:r>
               <a:rPr lang="en-US" dirty="0">
@@ -6299,11 +8381,30 @@
                 <a:latin typeface="Courier New" panose="02070309020205020404" pitchFamily="49" charset="0"/>
                 <a:cs typeface="Courier New" panose="02070309020205020404" pitchFamily="49" charset="0"/>
               </a:rPr>
-              <a:t>branch_name</a:t>
-            </a:r>
-            <a:r>
-              <a:rPr lang="en-US" dirty="0"/>
-              <a:t>  to new name:  </a:t>
+              <a:t>master</a:t>
+            </a:r>
+            <a:r>
+              <a:rPr lang="en-US" dirty="0"/>
+              <a:t>  branch, throwing away local modifications</a:t>
+            </a:r>
+          </a:p>
+          <a:p>
+            <a:pPr marL="801688" indent="0">
+              <a:buNone/>
+            </a:pPr>
+            <a:r>
+              <a:rPr lang="en-US" sz="1600" dirty="0">
+                <a:latin typeface="Courier New" panose="02070309020205020404" pitchFamily="49" charset="0"/>
+                <a:cs typeface="Courier New" panose="02070309020205020404" pitchFamily="49" charset="0"/>
+              </a:rPr>
+              <a:t>$ git checkout -f master</a:t>
+            </a:r>
+          </a:p>
+          <a:p>
+            <a:pPr lvl="1"/>
+            <a:r>
+              <a:rPr lang="en-US" dirty="0"/>
+              <a:t>revert changes in file  </a:t>
             </a:r>
             <a:r>
               <a:rPr lang="en-US" dirty="0">
@@ -6313,8 +8414,19 @@
                 <a:latin typeface="Courier New" panose="02070309020205020404" pitchFamily="49" charset="0"/>
                 <a:cs typeface="Courier New" panose="02070309020205020404" pitchFamily="49" charset="0"/>
               </a:rPr>
-              <a:t>new_branch_name</a:t>
-            </a:r>
+              <a:t>my_file.py</a:t>
+            </a:r>
+            <a:r>
+              <a:rPr lang="en-US" dirty="0"/>
+              <a:t> </a:t>
+            </a:r>
+            <a:endParaRPr lang="en-US" dirty="0">
+              <a:solidFill>
+                <a:schemeClr val="tx1"/>
+              </a:solidFill>
+              <a:latin typeface="Courier New" panose="02070309020205020404" pitchFamily="49" charset="0"/>
+              <a:cs typeface="Courier New" panose="02070309020205020404" pitchFamily="49" charset="0"/>
+            </a:endParaRPr>
           </a:p>
           <a:p>
             <a:pPr marL="801688" indent="0">
@@ -6325,14 +8437,14 @@
                 <a:latin typeface="Courier New" panose="02070309020205020404" pitchFamily="49" charset="0"/>
                 <a:cs typeface="Courier New" panose="02070309020205020404" pitchFamily="49" charset="0"/>
               </a:rPr>
-              <a:t>$ git branch -m branch_name new_branch_name</a:t>
-            </a:r>
-          </a:p>
-          <a:p>
-            <a:pPr lvl="1"/>
-            <a:r>
-              <a:rPr lang="en-US" dirty="0"/>
-              <a:t>Make current branch track  </a:t>
+              <a:t>$ git checkout path/to/my_file.py</a:t>
+            </a:r>
+          </a:p>
+          <a:p>
+            <a:pPr lvl="1"/>
+            <a:r>
+              <a:rPr lang="en-US" dirty="0"/>
+              <a:t>revert file </a:t>
             </a:r>
             <a:r>
               <a:rPr lang="en-US" dirty="0">
@@ -6342,12 +8454,23 @@
                 <a:latin typeface="Courier New" panose="02070309020205020404" pitchFamily="49" charset="0"/>
                 <a:cs typeface="Courier New" panose="02070309020205020404" pitchFamily="49" charset="0"/>
               </a:rPr>
-              <a:t>branch_name</a:t>
-            </a:r>
-            <a:r>
-              <a:rPr lang="en-US" dirty="0"/>
-              <a:t>  within remote repo “radiasoft”</a:t>
-            </a:r>
+              <a:t>my_file.py</a:t>
+            </a:r>
+            <a:r>
+              <a:rPr lang="en-US" dirty="0"/>
+              <a:t>  to its state in the branch  </a:t>
+            </a:r>
+            <a:r>
+              <a:rPr lang="en-US" dirty="0">
+                <a:solidFill>
+                  <a:schemeClr val="tx1"/>
+                </a:solidFill>
+                <a:latin typeface="Courier New" panose="02070309020205020404" pitchFamily="49" charset="0"/>
+                <a:cs typeface="Courier New" panose="02070309020205020404" pitchFamily="49" charset="0"/>
+              </a:rPr>
+              <a:t>my_branch</a:t>
+            </a:r>
+            <a:endParaRPr lang="en-US" dirty="0"/>
           </a:p>
           <a:p>
             <a:pPr marL="801688" indent="0">
@@ -6358,8 +8481,12 @@
                 <a:latin typeface="Courier New" panose="02070309020205020404" pitchFamily="49" charset="0"/>
                 <a:cs typeface="Courier New" panose="02070309020205020404" pitchFamily="49" charset="0"/>
               </a:rPr>
-              <a:t>$ git branch -u radiasoft branch_name</a:t>
-            </a:r>
+              <a:t>$ git checkout my_branch -- path/to/my_file.py</a:t>
+            </a:r>
+            <a:endParaRPr lang="en-US" dirty="0">
+              <a:latin typeface="Courier New" panose="02070309020205020404" pitchFamily="49" charset="0"/>
+              <a:cs typeface="Courier New" panose="02070309020205020404" pitchFamily="49" charset="0"/>
+            </a:endParaRPr>
           </a:p>
         </p:txBody>
       </p:sp>
@@ -6377,8 +8504,8 @@
         </p:nvSpPr>
         <p:spPr>
           <a:xfrm>
-            <a:off x="4380410" y="5876797"/>
-            <a:ext cx="4336869" cy="307777"/>
+            <a:off x="3979818" y="2137953"/>
+            <a:ext cx="4737462" cy="307777"/>
           </a:xfrm>
           <a:prstGeom prst="rect">
             <a:avLst/>
@@ -6406,7 +8533,7 @@
                 <a:latin typeface="Times New Roman" panose="02020603050405020304" pitchFamily="18" charset="0"/>
                 <a:cs typeface="Times New Roman" panose="02020603050405020304" pitchFamily="18" charset="0"/>
               </a:rPr>
-              <a:t>Docs for ‘git branch’, </a:t>
+              <a:t>Docs for ‘git checkout’, </a:t>
             </a:r>
             <a:r>
               <a:rPr lang="en-US" sz="1400" dirty="0">
@@ -6414,14 +8541,14 @@
                 <a:cs typeface="Times New Roman" panose="02020603050405020304" pitchFamily="18" charset="0"/>
                 <a:hlinkClick r:id="rId3"/>
               </a:rPr>
-              <a:t>https://git-scm.com/docs/git-branch</a:t>
+              <a:t>https://git-scm.com/docs/git-checkout</a:t>
             </a:r>
             <a:r>
               <a:rPr lang="en-US" sz="1400" dirty="0">
                 <a:latin typeface="Times New Roman" panose="02020603050405020304" pitchFamily="18" charset="0"/>
                 <a:cs typeface="Times New Roman" panose="02020603050405020304" pitchFamily="18" charset="0"/>
               </a:rPr>
-              <a:t> </a:t>
+              <a:t>  </a:t>
             </a:r>
           </a:p>
         </p:txBody>
@@ -6429,7 +8556,7 @@
     </p:spTree>
     <p:extLst>
       <p:ext uri="{BB962C8B-B14F-4D97-AF65-F5344CB8AC3E}">
-        <p14:creationId xmlns:p14="http://schemas.microsoft.com/office/powerpoint/2010/main" val="650932450"/>
+        <p14:creationId xmlns:p14="http://schemas.microsoft.com/office/powerpoint/2010/main" val="2052266732"/>
       </p:ext>
     </p:extLst>
   </p:cSld>
@@ -6468,7 +8595,7 @@
         </p:nvSpPr>
         <p:spPr>
           <a:xfrm>
-            <a:off x="0" y="140672"/>
+            <a:off x="0" y="62291"/>
             <a:ext cx="9144000" cy="589085"/>
           </a:xfrm>
         </p:spPr>
@@ -6480,7 +8607,7 @@
           <a:p>
             <a:r>
               <a:rPr lang="en-US" dirty="0"/>
-              <a:t>git – the Checkout command</a:t>
+              <a:t>git – how to Stage and Commit</a:t>
             </a:r>
             <a:endParaRPr lang="en-US" b="0" dirty="0"/>
           </a:p>
@@ -6498,7 +8625,7 @@
         </p:nvSpPr>
         <p:spPr>
           <a:xfrm>
-            <a:off x="276639" y="729758"/>
+            <a:off x="276639" y="651377"/>
             <a:ext cx="8608944" cy="5503894"/>
           </a:xfrm>
         </p:spPr>
@@ -6510,255 +8637,155 @@
           <a:p>
             <a:r>
               <a:rPr lang="en-US" dirty="0"/>
-              <a:t>It changes the </a:t>
-            </a:r>
-            <a:r>
-              <a:rPr lang="en-US" dirty="0">
+              <a:t>Staging – add changes from the working directory to staging index</a:t>
+            </a:r>
+          </a:p>
+          <a:p>
+            <a:pPr lvl="1"/>
+            <a:r>
+              <a:rPr lang="en-US" dirty="0"/>
+              <a:t>add new (untracked) file to staging index (or new changes to a tracked file)</a:t>
+            </a:r>
+          </a:p>
+          <a:p>
+            <a:pPr marL="739775" indent="0">
+              <a:buNone/>
+            </a:pPr>
+            <a:r>
+              <a:rPr lang="en-US" sz="1600" dirty="0">
                 <a:latin typeface="Courier New" panose="02070309020205020404" pitchFamily="49" charset="0"/>
                 <a:cs typeface="Courier New" panose="02070309020205020404" pitchFamily="49" charset="0"/>
               </a:rPr>
-              <a:t>HEAD</a:t>
-            </a:r>
-            <a:r>
-              <a:rPr lang="en-US" dirty="0"/>
-              <a:t> reference, so it points to a new address</a:t>
-            </a:r>
-          </a:p>
-          <a:p>
-            <a:pPr lvl="1"/>
-            <a:r>
-              <a:rPr lang="en-US" dirty="0"/>
-              <a:t>affects only the working directory</a:t>
-            </a:r>
-          </a:p>
-          <a:p>
-            <a:pPr lvl="1"/>
-            <a:r>
-              <a:rPr lang="en-US" dirty="0"/>
-              <a:t>secondary use:  undo changes in the working directory</a:t>
-            </a:r>
+              <a:t>$ git add path/to/file</a:t>
+            </a:r>
+          </a:p>
+          <a:p>
+            <a:pPr lvl="1"/>
+            <a:r>
+              <a:rPr lang="en-US" dirty="0"/>
+              <a:t>add all changes of tracked files to the staging index</a:t>
+            </a:r>
+          </a:p>
+          <a:p>
+            <a:pPr marL="739775" indent="0">
+              <a:buNone/>
+            </a:pPr>
+            <a:r>
+              <a:rPr lang="en-US" sz="1600" dirty="0">
+                <a:latin typeface="Courier New" panose="02070309020205020404" pitchFamily="49" charset="0"/>
+                <a:cs typeface="Courier New" panose="02070309020205020404" pitchFamily="49" charset="0"/>
+              </a:rPr>
+              <a:t>$ git add –u</a:t>
+            </a:r>
+          </a:p>
+          <a:p>
+            <a:pPr marL="0" indent="0">
+              <a:buNone/>
+            </a:pPr>
+            <a:endParaRPr lang="en-US" dirty="0"/>
+          </a:p>
+          <a:p>
+            <a:r>
+              <a:rPr lang="en-US" dirty="0"/>
+              <a:t>Commit – store changes within the commit tree</a:t>
+            </a:r>
+          </a:p>
+          <a:p>
+            <a:pPr lvl="1"/>
+            <a:r>
+              <a:rPr lang="en-US" dirty="0"/>
+              <a:t>changes may come from the staging index or directly from the working directory</a:t>
+            </a:r>
+          </a:p>
+          <a:p>
+            <a:pPr lvl="1"/>
+            <a:r>
+              <a:rPr lang="en-US" dirty="0"/>
+              <a:t>each commit requires a message to document the changes being recorded</a:t>
+            </a:r>
+          </a:p>
+          <a:p>
+            <a:r>
+              <a:rPr lang="en-US" dirty="0"/>
+              <a:t>Some examples:</a:t>
+            </a:r>
+          </a:p>
+          <a:p>
+            <a:pPr lvl="1"/>
+            <a:r>
+              <a:rPr lang="en-US" dirty="0"/>
+              <a:t>commit the staging index, and document with a message</a:t>
+            </a:r>
+          </a:p>
+          <a:p>
+            <a:pPr lvl="2"/>
+            <a:r>
+              <a:rPr lang="en-US" dirty="0"/>
+              <a:t>if don’t specify an inline message, an editor will be invoked</a:t>
+            </a:r>
+          </a:p>
+          <a:p>
+            <a:pPr marL="739775" indent="0">
+              <a:buNone/>
+            </a:pPr>
+            <a:r>
+              <a:rPr lang="en-US" sz="1600" dirty="0">
+                <a:latin typeface="Courier New" panose="02070309020205020404" pitchFamily="49" charset="0"/>
+                <a:cs typeface="Courier New" panose="02070309020205020404" pitchFamily="49" charset="0"/>
+              </a:rPr>
+              <a:t>$ git commit –m ‘this is my commit message’</a:t>
+            </a:r>
+          </a:p>
+          <a:p>
+            <a:pPr lvl="1"/>
+            <a:r>
+              <a:rPr lang="en-US" dirty="0"/>
+              <a:t>commit all changes in tracked files</a:t>
+            </a:r>
+          </a:p>
+          <a:p>
+            <a:pPr marL="739775" indent="0">
+              <a:buNone/>
+            </a:pPr>
+            <a:r>
+              <a:rPr lang="en-US" sz="1600" dirty="0">
+                <a:latin typeface="Courier New" panose="02070309020205020404" pitchFamily="49" charset="0"/>
+                <a:cs typeface="Courier New" panose="02070309020205020404" pitchFamily="49" charset="0"/>
+              </a:rPr>
+              <a:t>$ git add –a</a:t>
+            </a:r>
+            <a:endParaRPr lang="en-US" sz="1600" dirty="0"/>
+          </a:p>
+          <a:p>
+            <a:pPr lvl="1"/>
+            <a:r>
+              <a:rPr lang="en-US" dirty="0"/>
+              <a:t>commit changes within a specific file</a:t>
+            </a:r>
+          </a:p>
+          <a:p>
+            <a:pPr marL="739775" indent="0">
+              <a:buNone/>
+            </a:pPr>
+            <a:r>
+              <a:rPr lang="en-US" sz="1600" dirty="0">
+                <a:latin typeface="Courier New" panose="02070309020205020404" pitchFamily="49" charset="0"/>
+                <a:cs typeface="Courier New" panose="02070309020205020404" pitchFamily="49" charset="0"/>
+              </a:rPr>
+              <a:t>$ git commit /path/to/file –m ‘file is better now’</a:t>
+            </a:r>
+          </a:p>
+          <a:p>
+            <a:pPr marL="0" indent="0">
+              <a:buNone/>
+            </a:pPr>
+            <a:endParaRPr lang="en-US" sz="1700" dirty="0"/>
           </a:p>
           <a:p>
             <a:pPr marL="801688" indent="0">
               <a:buNone/>
             </a:pPr>
-            <a:r>
-              <a:rPr lang="en-US" sz="1600" dirty="0">
-                <a:latin typeface="Courier New" panose="02070309020205020404" pitchFamily="49" charset="0"/>
-                <a:cs typeface="Courier New" panose="02070309020205020404" pitchFamily="49" charset="0"/>
-              </a:rPr>
-              <a:t>$ git checkout [&lt;options&gt;] &lt;branch&gt;</a:t>
-            </a:r>
-          </a:p>
-          <a:p>
-            <a:pPr lvl="2"/>
-            <a:endParaRPr lang="en-US" dirty="0"/>
-          </a:p>
-          <a:p>
-            <a:r>
-              <a:rPr lang="en-US" dirty="0"/>
-              <a:t>Useful examples:</a:t>
-            </a:r>
-          </a:p>
-          <a:p>
-            <a:pPr lvl="1"/>
-            <a:r>
-              <a:rPr lang="en-US" dirty="0"/>
-              <a:t>get latest commit from the  </a:t>
-            </a:r>
-            <a:r>
-              <a:rPr lang="en-US" sz="1800" dirty="0">
-                <a:solidFill>
-                  <a:schemeClr val="tx1"/>
-                </a:solidFill>
-                <a:latin typeface="Courier New" panose="02070309020205020404" pitchFamily="49" charset="0"/>
-                <a:cs typeface="Courier New" panose="02070309020205020404" pitchFamily="49" charset="0"/>
-              </a:rPr>
-              <a:t>master</a:t>
-            </a:r>
-            <a:r>
-              <a:rPr lang="en-US" dirty="0"/>
-              <a:t>  branch for use in currently active branch</a:t>
-            </a:r>
-          </a:p>
-          <a:p>
-            <a:pPr marL="801688" indent="0">
-              <a:buNone/>
-            </a:pPr>
-            <a:r>
-              <a:rPr lang="en-US" sz="1600" dirty="0">
-                <a:latin typeface="Courier New" panose="02070309020205020404" pitchFamily="49" charset="0"/>
-                <a:cs typeface="Courier New" panose="02070309020205020404" pitchFamily="49" charset="0"/>
-              </a:rPr>
-              <a:t>$ git checkout master</a:t>
-            </a:r>
-          </a:p>
-          <a:p>
-            <a:pPr lvl="1"/>
-            <a:r>
-              <a:rPr lang="en-US" dirty="0"/>
-              <a:t>get an address (e.g. </a:t>
-            </a:r>
-            <a:r>
-              <a:rPr lang="en-US" dirty="0">
-                <a:solidFill>
-                  <a:srgbClr val="000000"/>
-                </a:solidFill>
-                <a:latin typeface="Courier New" panose="02070309020205020404" pitchFamily="49" charset="0"/>
-              </a:rPr>
-              <a:t>2d52a68</a:t>
-            </a:r>
-            <a:r>
-              <a:rPr lang="en-US" dirty="0"/>
-              <a:t>) and label it as branch  </a:t>
-            </a:r>
-            <a:r>
-              <a:rPr lang="en-US" sz="1800" dirty="0">
-                <a:solidFill>
-                  <a:schemeClr val="tx1"/>
-                </a:solidFill>
-                <a:latin typeface="Courier New" panose="02070309020205020404" pitchFamily="49" charset="0"/>
-                <a:cs typeface="Courier New" panose="02070309020205020404" pitchFamily="49" charset="0"/>
-              </a:rPr>
-              <a:t>new_branch_name</a:t>
-            </a:r>
-            <a:endParaRPr lang="en-US" dirty="0">
-              <a:solidFill>
-                <a:schemeClr val="tx1"/>
-              </a:solidFill>
-              <a:latin typeface="Courier New" panose="02070309020205020404" pitchFamily="49" charset="0"/>
-              <a:cs typeface="Courier New" panose="02070309020205020404" pitchFamily="49" charset="0"/>
-            </a:endParaRPr>
-          </a:p>
-          <a:p>
-            <a:pPr marL="801688" indent="0">
-              <a:buNone/>
-            </a:pPr>
-            <a:r>
-              <a:rPr lang="en-US" sz="1600" dirty="0">
-                <a:latin typeface="Courier New" panose="02070309020205020404" pitchFamily="49" charset="0"/>
-                <a:cs typeface="Courier New" panose="02070309020205020404" pitchFamily="49" charset="0"/>
-              </a:rPr>
-              <a:t>$ git checkout -b new_branch_name 2d52a68</a:t>
-            </a:r>
-          </a:p>
-          <a:p>
-            <a:pPr lvl="1"/>
-            <a:r>
-              <a:rPr lang="en-US" dirty="0"/>
-              <a:t>force a checkout from </a:t>
-            </a:r>
-            <a:r>
-              <a:rPr lang="en-US" dirty="0">
-                <a:solidFill>
-                  <a:schemeClr val="tx1"/>
-                </a:solidFill>
-                <a:latin typeface="Courier New" panose="02070309020205020404" pitchFamily="49" charset="0"/>
-                <a:cs typeface="Courier New" panose="02070309020205020404" pitchFamily="49" charset="0"/>
-              </a:rPr>
-              <a:t>master</a:t>
-            </a:r>
-            <a:r>
-              <a:rPr lang="en-US" dirty="0"/>
-              <a:t>  branch, throwing away local modifications</a:t>
-            </a:r>
-          </a:p>
-          <a:p>
-            <a:pPr marL="801688" indent="0">
-              <a:buNone/>
-            </a:pPr>
-            <a:r>
-              <a:rPr lang="en-US" sz="1600" dirty="0">
-                <a:latin typeface="Courier New" panose="02070309020205020404" pitchFamily="49" charset="0"/>
-                <a:cs typeface="Courier New" panose="02070309020205020404" pitchFamily="49" charset="0"/>
-              </a:rPr>
-              <a:t>$ git checkout -f master</a:t>
-            </a:r>
-          </a:p>
-          <a:p>
-            <a:pPr lvl="1"/>
-            <a:r>
-              <a:rPr lang="en-US" dirty="0"/>
-              <a:t>revert changes in file  </a:t>
-            </a:r>
-            <a:r>
-              <a:rPr lang="en-US" dirty="0">
-                <a:solidFill>
-                  <a:schemeClr val="tx1"/>
-                </a:solidFill>
-                <a:latin typeface="Courier New" panose="02070309020205020404" pitchFamily="49" charset="0"/>
-                <a:cs typeface="Courier New" panose="02070309020205020404" pitchFamily="49" charset="0"/>
-              </a:rPr>
-              <a:t>my_file.py</a:t>
-            </a:r>
-            <a:r>
-              <a:rPr lang="en-US" dirty="0"/>
-              <a:t> </a:t>
-            </a:r>
-            <a:endParaRPr lang="en-US" dirty="0">
-              <a:solidFill>
-                <a:schemeClr val="tx1"/>
-              </a:solidFill>
-              <a:latin typeface="Courier New" panose="02070309020205020404" pitchFamily="49" charset="0"/>
-              <a:cs typeface="Courier New" panose="02070309020205020404" pitchFamily="49" charset="0"/>
-            </a:endParaRPr>
-          </a:p>
-          <a:p>
-            <a:pPr marL="801688" indent="0">
-              <a:buNone/>
-            </a:pPr>
-            <a:r>
-              <a:rPr lang="en-US" sz="1600" dirty="0">
-                <a:latin typeface="Courier New" panose="02070309020205020404" pitchFamily="49" charset="0"/>
-                <a:cs typeface="Courier New" panose="02070309020205020404" pitchFamily="49" charset="0"/>
-              </a:rPr>
-              <a:t>$ git checkout path/to/my_file.py</a:t>
-            </a:r>
-          </a:p>
-          <a:p>
-            <a:pPr lvl="1"/>
-            <a:r>
-              <a:rPr lang="en-US" dirty="0"/>
-              <a:t>revert file </a:t>
-            </a:r>
-            <a:r>
-              <a:rPr lang="en-US" dirty="0">
-                <a:solidFill>
-                  <a:schemeClr val="tx1"/>
-                </a:solidFill>
-                <a:latin typeface="Courier New" panose="02070309020205020404" pitchFamily="49" charset="0"/>
-                <a:cs typeface="Courier New" panose="02070309020205020404" pitchFamily="49" charset="0"/>
-              </a:rPr>
-              <a:t>my_file.py</a:t>
-            </a:r>
-            <a:r>
-              <a:rPr lang="en-US" dirty="0"/>
-              <a:t>  to its state in the branch  </a:t>
-            </a:r>
-            <a:r>
-              <a:rPr lang="en-US" dirty="0">
-                <a:solidFill>
-                  <a:schemeClr val="tx1"/>
-                </a:solidFill>
-                <a:latin typeface="Courier New" panose="02070309020205020404" pitchFamily="49" charset="0"/>
-                <a:cs typeface="Courier New" panose="02070309020205020404" pitchFamily="49" charset="0"/>
-              </a:rPr>
-              <a:t>my_branch</a:t>
-            </a:r>
-            <a:endParaRPr lang="en-US" dirty="0"/>
-          </a:p>
-          <a:p>
-            <a:pPr marL="801688" indent="0">
-              <a:buNone/>
-            </a:pPr>
-            <a:r>
-              <a:rPr lang="en-US" sz="1600" dirty="0">
-                <a:latin typeface="Courier New" panose="02070309020205020404" pitchFamily="49" charset="0"/>
-                <a:cs typeface="Courier New" panose="02070309020205020404" pitchFamily="49" charset="0"/>
-              </a:rPr>
-              <a:t>$ git checkout my_branch -- path/to/my_file.py</a:t>
-            </a:r>
-            <a:endParaRPr lang="en-US" dirty="0">
+            <a:endParaRPr lang="en-US" sz="1600" dirty="0">
               <a:latin typeface="Courier New" panose="02070309020205020404" pitchFamily="49" charset="0"/>
               <a:cs typeface="Courier New" panose="02070309020205020404" pitchFamily="49" charset="0"/>
             </a:endParaRPr>
@@ -6779,7 +8806,7 @@
         </p:nvSpPr>
         <p:spPr>
           <a:xfrm>
-            <a:off x="3979818" y="6030685"/>
+            <a:off x="4277330" y="6079763"/>
             <a:ext cx="4737462" cy="307777"/>
           </a:xfrm>
           <a:prstGeom prst="rect">
@@ -6808,7 +8835,7 @@
                 <a:latin typeface="Times New Roman" panose="02020603050405020304" pitchFamily="18" charset="0"/>
                 <a:cs typeface="Times New Roman" panose="02020603050405020304" pitchFamily="18" charset="0"/>
               </a:rPr>
-              <a:t>Docs for ‘git checkout’, </a:t>
+              <a:t>Docs for ‘git commit’, </a:t>
             </a:r>
             <a:r>
               <a:rPr lang="en-US" sz="1400" dirty="0">
@@ -6816,14 +8843,77 @@
                 <a:cs typeface="Times New Roman" panose="02020603050405020304" pitchFamily="18" charset="0"/>
                 <a:hlinkClick r:id="rId3"/>
               </a:rPr>
-              <a:t>https://git-scm.com/docs/git-checkout</a:t>
+              <a:t>https://git-scm.com/docs/git-commit</a:t>
             </a:r>
             <a:r>
               <a:rPr lang="en-US" sz="1400" dirty="0">
                 <a:latin typeface="Times New Roman" panose="02020603050405020304" pitchFamily="18" charset="0"/>
                 <a:cs typeface="Times New Roman" panose="02020603050405020304" pitchFamily="18" charset="0"/>
               </a:rPr>
-              <a:t>  </a:t>
+              <a:t> </a:t>
+            </a:r>
+          </a:p>
+        </p:txBody>
+      </p:sp>
+      <p:sp>
+        <p:nvSpPr>
+          <p:cNvPr id="5" name="TextBox 4">
+            <a:extLst>
+              <a:ext uri="{FF2B5EF4-FFF2-40B4-BE49-F238E27FC236}">
+                <a16:creationId xmlns:a16="http://schemas.microsoft.com/office/drawing/2014/main" id="{5E72EC41-25D2-4A53-9E93-753312D282C6}"/>
+              </a:ext>
+            </a:extLst>
+          </p:cNvPr>
+          <p:cNvSpPr txBox="1"/>
+          <p:nvPr/>
+        </p:nvSpPr>
+        <p:spPr>
+          <a:xfrm>
+            <a:off x="4925312" y="1997622"/>
+            <a:ext cx="3942049" cy="307777"/>
+          </a:xfrm>
+          <a:prstGeom prst="rect">
+            <a:avLst/>
+          </a:prstGeom>
+          <a:noFill/>
+          <a:ln>
+            <a:solidFill>
+              <a:schemeClr val="tx1"/>
+            </a:solidFill>
+          </a:ln>
+        </p:spPr>
+        <p:txBody>
+          <a:bodyPr wrap="square" rtlCol="0">
+            <a:spAutoFit/>
+          </a:bodyPr>
+          <a:lstStyle/>
+          <a:p>
+            <a:pPr marL="227013" indent="-227013">
+              <a:spcBef>
+                <a:spcPts val="300"/>
+              </a:spcBef>
+            </a:pPr>
+            <a:r>
+              <a:rPr lang="en-US" sz="1400" dirty="0">
+                <a:latin typeface="Times New Roman" panose="02020603050405020304" pitchFamily="18" charset="0"/>
+                <a:cs typeface="Times New Roman" panose="02020603050405020304" pitchFamily="18" charset="0"/>
+              </a:rPr>
+              <a:t>Docs for ‘git add’, </a:t>
+            </a:r>
+            <a:r>
+              <a:rPr lang="en-US" sz="1400" dirty="0">
+                <a:latin typeface="Times New Roman" panose="02020603050405020304" pitchFamily="18" charset="0"/>
+                <a:cs typeface="Times New Roman" panose="02020603050405020304" pitchFamily="18" charset="0"/>
+                <a:hlinkClick r:id="rId4"/>
+              </a:rPr>
+              <a:t>https://git-scm.com/docs/git-add</a:t>
+            </a:r>
+            <a:r>
+              <a:rPr lang="en-US" sz="1400" dirty="0">
+                <a:latin typeface="Times New Roman" panose="02020603050405020304" pitchFamily="18" charset="0"/>
+                <a:cs typeface="Times New Roman" panose="02020603050405020304" pitchFamily="18" charset="0"/>
+              </a:rPr>
+              <a:t> </a:t>
             </a:r>
           </a:p>
         </p:txBody>
@@ -6831,7 +8921,7 @@
     </p:spTree>
     <p:extLst>
       <p:ext uri="{BB962C8B-B14F-4D97-AF65-F5344CB8AC3E}">
-        <p14:creationId xmlns:p14="http://schemas.microsoft.com/office/powerpoint/2010/main" val="2052266732"/>
+        <p14:creationId xmlns:p14="http://schemas.microsoft.com/office/powerpoint/2010/main" val="4250900700"/>
       </p:ext>
     </p:extLst>
   </p:cSld>

</xml_diff>

<commit_message>
some fixes based on student feedback
</commit_message>
<xml_diff>
--- a/software_version_control/02_VersionCont.pptx
+++ b/software_version_control/02_VersionCont.pptx
@@ -5000,7 +5000,7 @@
         </p:nvSpPr>
         <p:spPr>
           <a:xfrm>
-            <a:off x="0" y="140672"/>
+            <a:off x="0" y="88418"/>
             <a:ext cx="9144000" cy="589085"/>
           </a:xfrm>
         </p:spPr>
@@ -5030,7 +5030,7 @@
         </p:nvSpPr>
         <p:spPr>
           <a:xfrm>
-            <a:off x="276639" y="827314"/>
+            <a:off x="276639" y="775060"/>
             <a:ext cx="8608944" cy="5406337"/>
           </a:xfrm>
         </p:spPr>
@@ -5155,7 +5155,7 @@
                 <a:latin typeface="Courier New" panose="02070309020205020404" pitchFamily="49" charset="0"/>
                 <a:cs typeface="Courier New" panose="02070309020205020404" pitchFamily="49" charset="0"/>
               </a:rPr>
-              <a:t>$ git push</a:t>
+              <a:t>$ git push –set-upstream origin issue03</a:t>
             </a:r>
           </a:p>
           <a:p>
@@ -5198,13 +5198,16 @@
             </a:r>
           </a:p>
           <a:p>
-            <a:pPr marL="801688" indent="0">
+            <a:pPr marL="461963" indent="0">
               <a:buNone/>
             </a:pPr>
-            <a:endParaRPr lang="en-US" sz="1600" dirty="0">
-              <a:latin typeface="Courier New" panose="02070309020205020404" pitchFamily="49" charset="0"/>
-              <a:cs typeface="Courier New" panose="02070309020205020404" pitchFamily="49" charset="0"/>
-            </a:endParaRPr>
+            <a:r>
+              <a:rPr lang="en-US" sz="1600" dirty="0">
+                <a:latin typeface="Courier New" panose="02070309020205020404" pitchFamily="49" charset="0"/>
+                <a:cs typeface="Courier New" panose="02070309020205020404" pitchFamily="49" charset="0"/>
+              </a:rPr>
+              <a:t>$ git push origin master</a:t>
+            </a:r>
           </a:p>
         </p:txBody>
       </p:sp>
@@ -5222,7 +5225,7 @@
         </p:nvSpPr>
         <p:spPr>
           <a:xfrm>
-            <a:off x="4659084" y="5401699"/>
+            <a:off x="4659084" y="5645550"/>
             <a:ext cx="4336869" cy="307777"/>
           </a:xfrm>
           <a:prstGeom prst="rect">
@@ -5285,7 +5288,7 @@
         </p:nvSpPr>
         <p:spPr>
           <a:xfrm>
-            <a:off x="1184366" y="5807033"/>
+            <a:off x="1184366" y="6050884"/>
             <a:ext cx="7811587" cy="307777"/>
           </a:xfrm>
           <a:prstGeom prst="rect">

</xml_diff>